<commit_message>
update deep learning project
</commit_message>
<xml_diff>
--- a/Deep Learning and Reinforcement Learning/Deep Learning Project_ Urban Area Detection System.pptx
+++ b/Deep Learning and Reinforcement Learning/Deep Learning Project_ Urban Area Detection System.pptx
@@ -31,30 +31,31 @@
     <p:sldId id="276" r:id="rId27"/>
     <p:sldId id="277" r:id="rId28"/>
     <p:sldId id="278" r:id="rId29"/>
+    <p:sldId id="279" r:id="rId30"/>
   </p:sldIdLst>
   <p:sldSz cy="5143500" cx="9144000"/>
   <p:notesSz cx="6858000" cy="9144000"/>
   <p:embeddedFontLst>
     <p:embeddedFont>
       <p:font typeface="Roboto"/>
-      <p:regular r:id="rId30"/>
-      <p:bold r:id="rId31"/>
-      <p:italic r:id="rId32"/>
-      <p:boldItalic r:id="rId33"/>
+      <p:regular r:id="rId31"/>
+      <p:bold r:id="rId32"/>
+      <p:italic r:id="rId33"/>
+      <p:boldItalic r:id="rId34"/>
     </p:embeddedFont>
     <p:embeddedFont>
       <p:font typeface="Nunito"/>
-      <p:regular r:id="rId34"/>
-      <p:bold r:id="rId35"/>
-      <p:italic r:id="rId36"/>
-      <p:boldItalic r:id="rId37"/>
+      <p:regular r:id="rId35"/>
+      <p:bold r:id="rId36"/>
+      <p:italic r:id="rId37"/>
+      <p:boldItalic r:id="rId38"/>
     </p:embeddedFont>
     <p:embeddedFont>
       <p:font typeface="IBM Plex Mono"/>
-      <p:regular r:id="rId38"/>
-      <p:bold r:id="rId39"/>
-      <p:italic r:id="rId40"/>
-      <p:boldItalic r:id="rId41"/>
+      <p:regular r:id="rId39"/>
+      <p:bold r:id="rId40"/>
+      <p:italic r:id="rId41"/>
+      <p:boldItalic r:id="rId42"/>
     </p:embeddedFont>
   </p:embeddedFontLst>
   <p:defaultTextStyle>
@@ -849,7 +850,7 @@
       </p:grpSpPr>
       <p:sp>
         <p:nvSpPr>
-          <p:cNvPr id="182" name="Google Shape;182;g2663b6d6e7b_0_874:notes"/>
+          <p:cNvPr id="182" name="Google Shape;182;g2663b6d6e7b_0_894:notes"/>
           <p:cNvSpPr/>
           <p:nvPr>
             <p:ph idx="2" type="sldImg"/>
@@ -884,7 +885,7 @@
       </p:sp>
       <p:sp>
         <p:nvSpPr>
-          <p:cNvPr id="183" name="Google Shape;183;g2663b6d6e7b_0_874:notes"/>
+          <p:cNvPr id="183" name="Google Shape;183;g2663b6d6e7b_0_894:notes"/>
           <p:cNvSpPr txBox="1"/>
           <p:nvPr>
             <p:ph idx="1" type="body"/>
@@ -912,17 +913,34 @@
               <a:spcAft>
                 <a:spcPts val="0"/>
               </a:spcAft>
+              <a:buClr>
+                <a:schemeClr val="dk1"/>
+              </a:buClr>
+              <a:buSzPts val="1100"/>
+              <a:buFont typeface="Arial"/>
               <a:buNone/>
             </a:pPr>
             <a:r>
-              <a:rPr lang="zh-TW"/>
-              <a:t>Next, w</a:t>
-            </a:r>
-            <a:r>
-              <a:rPr lang="zh-TW"/>
-              <a:t>e choose ResNet, pre-trained on ImageNet, an extensive image dataset consisting of over 14 million images spanning thousands of categories.</a:t>
-            </a:r>
-            <a:endParaRPr/>
+              <a:rPr lang="zh-TW" sz="1200">
+                <a:solidFill>
+                  <a:srgbClr val="434343"/>
+                </a:solidFill>
+                <a:latin typeface="Roboto"/>
+                <a:ea typeface="Roboto"/>
+                <a:cs typeface="Roboto"/>
+                <a:sym typeface="Roboto"/>
+              </a:rPr>
+              <a:t>Data augmentation presents a cost-effective and efficient method for enhancing the performance and precision of machine learning models, especially in situations with limited data availability. To boost the representation of the "cat" class, one can replicate cat images and mirror them horizontally. Additional modifications, such as rotation, cropping, and translation, can also be applied.</a:t>
+            </a:r>
+            <a:endParaRPr sz="1200">
+              <a:solidFill>
+                <a:srgbClr val="434343"/>
+              </a:solidFill>
+              <a:latin typeface="Roboto"/>
+              <a:ea typeface="Roboto"/>
+              <a:cs typeface="Roboto"/>
+              <a:sym typeface="Roboto"/>
+            </a:endParaRPr>
           </a:p>
           <a:p>
             <a:pPr indent="0" lvl="0" marL="0" rtl="0" algn="l">
@@ -932,13 +950,85 @@
               <a:spcAft>
                 <a:spcPts val="0"/>
               </a:spcAft>
+              <a:buClr>
+                <a:schemeClr val="dk1"/>
+              </a:buClr>
+              <a:buSzPts val="1100"/>
+              <a:buFont typeface="Arial"/>
               <a:buNone/>
             </a:pPr>
             <a:r>
-              <a:rPr lang="zh-TW"/>
-              <a:t>Keras makes available several models that have been pre-trained on this dataset here. </a:t>
-            </a:r>
-            <a:endParaRPr/>
+              <a:t/>
+            </a:r>
+            <a:endParaRPr sz="1200">
+              <a:solidFill>
+                <a:srgbClr val="434343"/>
+              </a:solidFill>
+              <a:latin typeface="Roboto"/>
+              <a:ea typeface="Roboto"/>
+              <a:cs typeface="Roboto"/>
+              <a:sym typeface="Roboto"/>
+            </a:endParaRPr>
+          </a:p>
+          <a:p>
+            <a:pPr indent="0" lvl="0" marL="0" rtl="0" algn="l">
+              <a:spcBef>
+                <a:spcPts val="0"/>
+              </a:spcBef>
+              <a:spcAft>
+                <a:spcPts val="0"/>
+              </a:spcAft>
+              <a:buClr>
+                <a:schemeClr val="dk1"/>
+              </a:buClr>
+              <a:buSzPts val="1100"/>
+              <a:buFont typeface="Arial"/>
+              <a:buNone/>
+            </a:pPr>
+            <a:r>
+              <a:rPr lang="zh-TW" sz="1200">
+                <a:solidFill>
+                  <a:srgbClr val="434343"/>
+                </a:solidFill>
+                <a:latin typeface="Roboto"/>
+                <a:ea typeface="Roboto"/>
+                <a:cs typeface="Roboto"/>
+                <a:sym typeface="Roboto"/>
+              </a:rPr>
+              <a:t>In our specific scenario, unrestricted rotation is not feasible due to the necessity for the building to maintain an upright appearance. Nevertheless, horizontal flipping and cropping remains a viable option. Furthermore, simulating varying weather conditions by adjusting image brightness can contribute to the generation of augmented data, offering the model exposure to diverse environmental factors.</a:t>
+            </a:r>
+            <a:endParaRPr sz="1200">
+              <a:solidFill>
+                <a:srgbClr val="434343"/>
+              </a:solidFill>
+              <a:latin typeface="Roboto"/>
+              <a:ea typeface="Roboto"/>
+              <a:cs typeface="Roboto"/>
+              <a:sym typeface="Roboto"/>
+            </a:endParaRPr>
+          </a:p>
+          <a:p>
+            <a:pPr indent="0" lvl="0" marL="0" rtl="0" algn="l">
+              <a:spcBef>
+                <a:spcPts val="0"/>
+              </a:spcBef>
+              <a:spcAft>
+                <a:spcPts val="0"/>
+              </a:spcAft>
+              <a:buNone/>
+            </a:pPr>
+            <a:r>
+              <a:t/>
+            </a:r>
+            <a:endParaRPr sz="1200">
+              <a:solidFill>
+                <a:srgbClr val="434343"/>
+              </a:solidFill>
+              <a:latin typeface="Roboto"/>
+              <a:ea typeface="Roboto"/>
+              <a:cs typeface="Roboto"/>
+              <a:sym typeface="Roboto"/>
+            </a:endParaRPr>
           </a:p>
         </p:txBody>
       </p:sp>
@@ -969,7 +1059,7 @@
       </p:grpSpPr>
       <p:sp>
         <p:nvSpPr>
-          <p:cNvPr id="189" name="Google Shape;189;g2b32b8de6d2_0_6:notes"/>
+          <p:cNvPr id="189" name="Google Shape;189;g2663b6d6e7b_0_874:notes"/>
           <p:cNvSpPr/>
           <p:nvPr>
             <p:ph idx="2" type="sldImg"/>
@@ -1004,7 +1094,7 @@
       </p:sp>
       <p:sp>
         <p:nvSpPr>
-          <p:cNvPr id="190" name="Google Shape;190;g2b32b8de6d2_0_6:notes"/>
+          <p:cNvPr id="190" name="Google Shape;190;g2663b6d6e7b_0_874:notes"/>
           <p:cNvSpPr txBox="1"/>
           <p:nvPr>
             <p:ph idx="1" type="body"/>
@@ -1035,7 +1125,28 @@
               <a:buNone/>
             </a:pPr>
             <a:r>
-              <a:t/>
+              <a:rPr lang="zh-TW"/>
+              <a:t>Next, w</a:t>
+            </a:r>
+            <a:r>
+              <a:rPr lang="zh-TW"/>
+              <a:t>e choose ResNet, pre-trained on ImageNet, an extensive image dataset consisting of over 14 million images spanning thousands of categories.</a:t>
+            </a:r>
+            <a:endParaRPr/>
+          </a:p>
+          <a:p>
+            <a:pPr indent="0" lvl="0" marL="0" rtl="0" algn="l">
+              <a:spcBef>
+                <a:spcPts val="0"/>
+              </a:spcBef>
+              <a:spcAft>
+                <a:spcPts val="0"/>
+              </a:spcAft>
+              <a:buNone/>
+            </a:pPr>
+            <a:r>
+              <a:rPr lang="zh-TW"/>
+              <a:t>Keras makes available several models that have been pre-trained on this dataset here. </a:t>
             </a:r>
             <a:endParaRPr/>
           </a:p>
@@ -1068,7 +1179,7 @@
       </p:grpSpPr>
       <p:sp>
         <p:nvSpPr>
-          <p:cNvPr id="196" name="Google Shape;196;g2b32b8de6d2_0_23:notes"/>
+          <p:cNvPr id="196" name="Google Shape;196;g2b32b8de6d2_0_6:notes"/>
           <p:cNvSpPr/>
           <p:nvPr>
             <p:ph idx="2" type="sldImg"/>
@@ -1103,7 +1214,7 @@
       </p:sp>
       <p:sp>
         <p:nvSpPr>
-          <p:cNvPr id="197" name="Google Shape;197;g2b32b8de6d2_0_23:notes"/>
+          <p:cNvPr id="197" name="Google Shape;197;g2b32b8de6d2_0_6:notes"/>
           <p:cNvSpPr txBox="1"/>
           <p:nvPr>
             <p:ph idx="1" type="body"/>
@@ -1153,7 +1264,7 @@
   <p:cSld>
     <p:spTree>
       <p:nvGrpSpPr>
-        <p:cNvPr id="206" name="Shape 206"/>
+        <p:cNvPr id="202" name="Shape 202"/>
         <p:cNvGrpSpPr/>
         <p:nvPr/>
       </p:nvGrpSpPr>
@@ -1167,7 +1278,7 @@
       </p:grpSpPr>
       <p:sp>
         <p:nvSpPr>
-          <p:cNvPr id="207" name="Google Shape;207;g2663b6d6e7b_0_162:notes"/>
+          <p:cNvPr id="203" name="Google Shape;203;g2b32b8de6d2_0_23:notes"/>
           <p:cNvSpPr/>
           <p:nvPr>
             <p:ph idx="2" type="sldImg"/>
@@ -1202,7 +1313,7 @@
       </p:sp>
       <p:sp>
         <p:nvSpPr>
-          <p:cNvPr id="208" name="Google Shape;208;g2663b6d6e7b_0_162:notes"/>
+          <p:cNvPr id="204" name="Google Shape;204;g2b32b8de6d2_0_23:notes"/>
           <p:cNvSpPr txBox="1"/>
           <p:nvPr>
             <p:ph idx="1" type="body"/>
@@ -1266,7 +1377,7 @@
       </p:grpSpPr>
       <p:sp>
         <p:nvSpPr>
-          <p:cNvPr id="214" name="Google Shape;214;g2663b6d6e7b_0_660:notes"/>
+          <p:cNvPr id="214" name="Google Shape;214;g2663b6d6e7b_0_162:notes"/>
           <p:cNvSpPr/>
           <p:nvPr>
             <p:ph idx="2" type="sldImg"/>
@@ -1301,7 +1412,7 @@
       </p:sp>
       <p:sp>
         <p:nvSpPr>
-          <p:cNvPr id="215" name="Google Shape;215;g2663b6d6e7b_0_660:notes"/>
+          <p:cNvPr id="215" name="Google Shape;215;g2663b6d6e7b_0_162:notes"/>
           <p:cNvSpPr txBox="1"/>
           <p:nvPr>
             <p:ph idx="1" type="body"/>
@@ -1329,122 +1440,12 @@
               <a:spcAft>
                 <a:spcPts val="0"/>
               </a:spcAft>
-              <a:buClr>
-                <a:schemeClr val="dk1"/>
-              </a:buClr>
-              <a:buSzPts val="1100"/>
-              <a:buFont typeface="Arial"/>
               <a:buNone/>
             </a:pPr>
             <a:r>
-              <a:rPr lang="zh-TW" sz="1050">
-                <a:solidFill>
-                  <a:schemeClr val="dk1"/>
-                </a:solidFill>
-              </a:rPr>
-              <a:t>The parameters from ResNet are frozen, allowing only the last layer to be trainable. Therefore, the total number of trainable parameters is equal to twice the number of nodes in the last layer (2 * 2048), resulting in 4096 parameters.</a:t>
-            </a:r>
-            <a:endParaRPr sz="1050">
-              <a:solidFill>
-                <a:schemeClr val="dk1"/>
-              </a:solidFill>
-            </a:endParaRPr>
-          </a:p>
-          <a:p>
-            <a:pPr indent="0" lvl="0" marL="0" rtl="0" algn="l">
-              <a:spcBef>
-                <a:spcPts val="0"/>
-              </a:spcBef>
-              <a:spcAft>
-                <a:spcPts val="0"/>
-              </a:spcAft>
-              <a:buClr>
-                <a:schemeClr val="dk1"/>
-              </a:buClr>
-              <a:buSzPts val="1100"/>
-              <a:buFont typeface="Arial"/>
-              <a:buNone/>
-            </a:pPr>
-            <a:r>
               <a:t/>
             </a:r>
-            <a:endParaRPr sz="1050">
-              <a:solidFill>
-                <a:schemeClr val="dk1"/>
-              </a:solidFill>
-            </a:endParaRPr>
-          </a:p>
-          <a:p>
-            <a:pPr indent="0" lvl="0" marL="0" rtl="0" algn="l">
-              <a:spcBef>
-                <a:spcPts val="0"/>
-              </a:spcBef>
-              <a:spcAft>
-                <a:spcPts val="0"/>
-              </a:spcAft>
-              <a:buClr>
-                <a:schemeClr val="dk1"/>
-              </a:buClr>
-              <a:buSzPts val="1100"/>
-              <a:buFont typeface="Arial"/>
-              <a:buNone/>
-            </a:pPr>
-            <a:r>
-              <a:rPr lang="zh-TW" sz="1050">
-                <a:solidFill>
-                  <a:schemeClr val="dk1"/>
-                </a:solidFill>
-              </a:rPr>
-              <a:t>We employ stochastic gradient descent (SGD) to minimize the categorical cross-entropy loss. Additionally, we instruct the code to provide the accuracy metric, representing the fraction of correct predictions. This metric is more straightforward to interpret compared to categorical cross-entropy scores, making it beneficial to print and assess the model's performance.</a:t>
-            </a:r>
-            <a:endParaRPr sz="1050">
-              <a:solidFill>
-                <a:schemeClr val="dk1"/>
-              </a:solidFill>
-            </a:endParaRPr>
-          </a:p>
-          <a:p>
-            <a:pPr indent="0" lvl="0" marL="0" rtl="0" algn="l">
-              <a:spcBef>
-                <a:spcPts val="0"/>
-              </a:spcBef>
-              <a:spcAft>
-                <a:spcPts val="0"/>
-              </a:spcAft>
-              <a:buClr>
-                <a:schemeClr val="dk1"/>
-              </a:buClr>
-              <a:buSzPts val="1100"/>
-              <a:buFont typeface="Arial"/>
-              <a:buNone/>
-            </a:pPr>
-            <a:r>
-              <a:t/>
-            </a:r>
-            <a:endParaRPr sz="1050">
-              <a:solidFill>
-                <a:schemeClr val="dk1"/>
-              </a:solidFill>
-            </a:endParaRPr>
-          </a:p>
-          <a:p>
-            <a:pPr indent="0" lvl="0" marL="0" rtl="0" algn="l">
-              <a:spcBef>
-                <a:spcPts val="0"/>
-              </a:spcBef>
-              <a:spcAft>
-                <a:spcPts val="0"/>
-              </a:spcAft>
-              <a:buNone/>
-            </a:pPr>
-            <a:r>
-              <a:t/>
-            </a:r>
-            <a:endParaRPr sz="1050">
-              <a:solidFill>
-                <a:schemeClr val="dk1"/>
-              </a:solidFill>
-            </a:endParaRPr>
+            <a:endParaRPr/>
           </a:p>
         </p:txBody>
       </p:sp>
@@ -1475,7 +1476,7 @@
       </p:grpSpPr>
       <p:sp>
         <p:nvSpPr>
-          <p:cNvPr id="221" name="Google Shape;221;g2663b6d6e7b_0_676:notes"/>
+          <p:cNvPr id="221" name="Google Shape;221;g2663b6d6e7b_0_660:notes"/>
           <p:cNvSpPr/>
           <p:nvPr>
             <p:ph idx="2" type="sldImg"/>
@@ -1510,7 +1511,7 @@
       </p:sp>
       <p:sp>
         <p:nvSpPr>
-          <p:cNvPr id="222" name="Google Shape;222;g2663b6d6e7b_0_676:notes"/>
+          <p:cNvPr id="222" name="Google Shape;222;g2663b6d6e7b_0_660:notes"/>
           <p:cNvSpPr txBox="1"/>
           <p:nvPr>
             <p:ph idx="1" type="body"/>
@@ -1538,34 +1539,6 @@
               <a:spcAft>
                 <a:spcPts val="0"/>
               </a:spcAft>
-              <a:buNone/>
-            </a:pPr>
-            <a:r>
-              <a:rPr lang="zh-TW"/>
-              <a:t>The displayed validation accuracy </a:t>
-            </a:r>
-            <a:r>
-              <a:rPr lang="zh-TW"/>
-              <a:t>may </a:t>
-            </a:r>
-            <a:r>
-              <a:rPr lang="zh-TW"/>
-              <a:t>appear significantly better than the training accuracy </a:t>
-            </a:r>
-            <a:r>
-              <a:rPr lang="zh-TW"/>
-              <a:t>during this stage, which might be initially perplexing.</a:t>
-            </a:r>
-            <a:endParaRPr/>
-          </a:p>
-          <a:p>
-            <a:pPr indent="0" lvl="0" marL="0" rtl="0" algn="l">
-              <a:spcBef>
-                <a:spcPts val="0"/>
-              </a:spcBef>
-              <a:spcAft>
-                <a:spcPts val="0"/>
-              </a:spcAft>
               <a:buClr>
                 <a:schemeClr val="dk1"/>
               </a:buClr>
@@ -1574,87 +1547,18 @@
               <a:buNone/>
             </a:pPr>
             <a:r>
-              <a:t/>
-            </a:r>
-            <a:endParaRPr/>
-          </a:p>
-          <a:p>
-            <a:pPr indent="0" lvl="0" marL="0" rtl="0" algn="l">
-              <a:spcBef>
-                <a:spcPts val="0"/>
-              </a:spcBef>
-              <a:spcAft>
-                <a:spcPts val="0"/>
-              </a:spcAft>
-              <a:buNone/>
-            </a:pPr>
-            <a:r>
-              <a:rPr lang="zh-TW"/>
-              <a:t>This discrepancy arises because the training accuracy is computed at various intervals as the neural network undergoes improvement (the numbers in the convolutions were being updated to make the model more accurate). When the model encounters the initial training images, the weights haven't undergone extensive training or improvement yet, impacting the initial training accuracy calculation. These initial results are then averaged into the overall measure.</a:t>
-            </a:r>
-            <a:endParaRPr/>
-          </a:p>
-          <a:p>
-            <a:pPr indent="0" lvl="0" marL="0" rtl="0" algn="l">
-              <a:spcBef>
-                <a:spcPts val="0"/>
-              </a:spcBef>
-              <a:spcAft>
-                <a:spcPts val="0"/>
-              </a:spcAft>
-              <a:buNone/>
-            </a:pPr>
-            <a:r>
-              <a:t/>
-            </a:r>
-            <a:endParaRPr/>
-          </a:p>
-          <a:p>
-            <a:pPr indent="0" lvl="0" marL="0" rtl="0" algn="l">
-              <a:spcBef>
-                <a:spcPts val="0"/>
-              </a:spcBef>
-              <a:spcAft>
-                <a:spcPts val="0"/>
-              </a:spcAft>
-              <a:buNone/>
-            </a:pPr>
-            <a:r>
-              <a:rPr lang="zh-TW"/>
-              <a:t>In contrast, validation loss and accuracy metrics are calculated after the model has processed the entire dataset. At this point, the network has undergone complete training, resulting in the calculation of these scores.</a:t>
-            </a:r>
-            <a:endParaRPr/>
-          </a:p>
-          <a:p>
-            <a:pPr indent="0" lvl="0" marL="0" rtl="0" algn="l">
-              <a:spcBef>
-                <a:spcPts val="0"/>
-              </a:spcBef>
-              <a:spcAft>
-                <a:spcPts val="0"/>
-              </a:spcAft>
-              <a:buNone/>
-            </a:pPr>
-            <a:r>
-              <a:rPr lang="zh-TW"/>
-              <a:t>While this difference can be puzzling at first, it is not a significant concern in practice, and it is typically not a cause for worry.</a:t>
-            </a:r>
-            <a:endParaRPr/>
-          </a:p>
-          <a:p>
-            <a:pPr indent="0" lvl="0" marL="0" rtl="0" algn="l">
-              <a:spcBef>
-                <a:spcPts val="0"/>
-              </a:spcBef>
-              <a:spcAft>
-                <a:spcPts val="0"/>
-              </a:spcAft>
-              <a:buNone/>
-            </a:pPr>
-            <a:r>
-              <a:t/>
-            </a:r>
-            <a:endParaRPr/>
+              <a:rPr lang="zh-TW" sz="1050">
+                <a:solidFill>
+                  <a:schemeClr val="dk1"/>
+                </a:solidFill>
+              </a:rPr>
+              <a:t>The parameters from ResNet are frozen, allowing only the last layer to be trainable. Therefore, the total number of trainable parameters is equal to twice the number of nodes in the last layer (2 * 2048), resulting in 4096 parameters.</a:t>
+            </a:r>
+            <a:endParaRPr sz="1050">
+              <a:solidFill>
+                <a:schemeClr val="dk1"/>
+              </a:solidFill>
+            </a:endParaRPr>
           </a:p>
           <a:p>
             <a:pPr indent="0" lvl="0" marL="0" rtl="0" algn="l">
@@ -1672,10 +1576,13 @@
               <a:buNone/>
             </a:pPr>
             <a:r>
-              <a:rPr lang="zh-TW"/>
-              <a:t>After implementing data augmentation, we observed improved results using the same training data.</a:t>
-            </a:r>
-            <a:endParaRPr/>
+              <a:t/>
+            </a:r>
+            <a:endParaRPr sz="1050">
+              <a:solidFill>
+                <a:schemeClr val="dk1"/>
+              </a:solidFill>
+            </a:endParaRPr>
           </a:p>
           <a:p>
             <a:pPr indent="0" lvl="0" marL="0" rtl="0" algn="l">
@@ -1685,12 +1592,69 @@
               <a:spcAft>
                 <a:spcPts val="0"/>
               </a:spcAft>
+              <a:buClr>
+                <a:schemeClr val="dk1"/>
+              </a:buClr>
+              <a:buSzPts val="1100"/>
+              <a:buFont typeface="Arial"/>
               <a:buNone/>
             </a:pPr>
             <a:r>
+              <a:rPr lang="zh-TW" sz="1050">
+                <a:solidFill>
+                  <a:schemeClr val="dk1"/>
+                </a:solidFill>
+              </a:rPr>
+              <a:t>We employ stochastic gradient descent (SGD) to minimize the categorical cross-entropy loss. Additionally, we instruct the code to provide the accuracy metric, representing the fraction of correct predictions. This metric is more straightforward to interpret compared to categorical cross-entropy scores, making it beneficial to print and assess the model's performance.</a:t>
+            </a:r>
+            <a:endParaRPr sz="1050">
+              <a:solidFill>
+                <a:schemeClr val="dk1"/>
+              </a:solidFill>
+            </a:endParaRPr>
+          </a:p>
+          <a:p>
+            <a:pPr indent="0" lvl="0" marL="0" rtl="0" algn="l">
+              <a:spcBef>
+                <a:spcPts val="0"/>
+              </a:spcBef>
+              <a:spcAft>
+                <a:spcPts val="0"/>
+              </a:spcAft>
+              <a:buClr>
+                <a:schemeClr val="dk1"/>
+              </a:buClr>
+              <a:buSzPts val="1100"/>
+              <a:buFont typeface="Arial"/>
+              <a:buNone/>
+            </a:pPr>
+            <a:r>
               <a:t/>
             </a:r>
-            <a:endParaRPr/>
+            <a:endParaRPr sz="1050">
+              <a:solidFill>
+                <a:schemeClr val="dk1"/>
+              </a:solidFill>
+            </a:endParaRPr>
+          </a:p>
+          <a:p>
+            <a:pPr indent="0" lvl="0" marL="0" rtl="0" algn="l">
+              <a:spcBef>
+                <a:spcPts val="0"/>
+              </a:spcBef>
+              <a:spcAft>
+                <a:spcPts val="0"/>
+              </a:spcAft>
+              <a:buNone/>
+            </a:pPr>
+            <a:r>
+              <a:t/>
+            </a:r>
+            <a:endParaRPr sz="1050">
+              <a:solidFill>
+                <a:schemeClr val="dk1"/>
+              </a:solidFill>
+            </a:endParaRPr>
           </a:p>
         </p:txBody>
       </p:sp>
@@ -1707,7 +1671,7 @@
   <p:cSld>
     <p:spTree>
       <p:nvGrpSpPr>
-        <p:cNvPr id="230" name="Shape 230"/>
+        <p:cNvPr id="227" name="Shape 227"/>
         <p:cNvGrpSpPr/>
         <p:nvPr/>
       </p:nvGrpSpPr>
@@ -1721,7 +1685,7 @@
       </p:grpSpPr>
       <p:sp>
         <p:nvSpPr>
-          <p:cNvPr id="231" name="Google Shape;231;g2663b6d6e7b_0_942:notes"/>
+          <p:cNvPr id="228" name="Google Shape;228;g2663b6d6e7b_0_676:notes"/>
           <p:cNvSpPr/>
           <p:nvPr>
             <p:ph idx="2" type="sldImg"/>
@@ -1756,7 +1720,7 @@
       </p:sp>
       <p:sp>
         <p:nvSpPr>
-          <p:cNvPr id="232" name="Google Shape;232;g2663b6d6e7b_0_942:notes"/>
+          <p:cNvPr id="229" name="Google Shape;229;g2663b6d6e7b_0_676:notes"/>
           <p:cNvSpPr txBox="1"/>
           <p:nvPr>
             <p:ph idx="1" type="body"/>
@@ -1787,6 +1751,153 @@
               <a:buNone/>
             </a:pPr>
             <a:r>
+              <a:rPr lang="zh-TW"/>
+              <a:t>The displayed validation accuracy </a:t>
+            </a:r>
+            <a:r>
+              <a:rPr lang="zh-TW"/>
+              <a:t>may </a:t>
+            </a:r>
+            <a:r>
+              <a:rPr lang="zh-TW"/>
+              <a:t>appear significantly better than the training accuracy </a:t>
+            </a:r>
+            <a:r>
+              <a:rPr lang="zh-TW"/>
+              <a:t>during this stage, which might be initially perplexing.</a:t>
+            </a:r>
+            <a:endParaRPr/>
+          </a:p>
+          <a:p>
+            <a:pPr indent="0" lvl="0" marL="0" rtl="0" algn="l">
+              <a:spcBef>
+                <a:spcPts val="0"/>
+              </a:spcBef>
+              <a:spcAft>
+                <a:spcPts val="0"/>
+              </a:spcAft>
+              <a:buClr>
+                <a:schemeClr val="dk1"/>
+              </a:buClr>
+              <a:buSzPts val="1100"/>
+              <a:buFont typeface="Arial"/>
+              <a:buNone/>
+            </a:pPr>
+            <a:r>
+              <a:t/>
+            </a:r>
+            <a:endParaRPr/>
+          </a:p>
+          <a:p>
+            <a:pPr indent="0" lvl="0" marL="0" rtl="0" algn="l">
+              <a:spcBef>
+                <a:spcPts val="0"/>
+              </a:spcBef>
+              <a:spcAft>
+                <a:spcPts val="0"/>
+              </a:spcAft>
+              <a:buNone/>
+            </a:pPr>
+            <a:r>
+              <a:rPr lang="zh-TW"/>
+              <a:t>This discrepancy arises because the training accuracy is computed at various intervals as the neural network undergoes improvement (the numbers in the convolutions were being updated to make the model more accurate). When the model encounters the initial training images, the weights haven't undergone extensive training or improvement yet, impacting the initial training accuracy calculation. These initial results are then averaged into the overall measure.</a:t>
+            </a:r>
+            <a:endParaRPr/>
+          </a:p>
+          <a:p>
+            <a:pPr indent="0" lvl="0" marL="0" rtl="0" algn="l">
+              <a:spcBef>
+                <a:spcPts val="0"/>
+              </a:spcBef>
+              <a:spcAft>
+                <a:spcPts val="0"/>
+              </a:spcAft>
+              <a:buNone/>
+            </a:pPr>
+            <a:r>
+              <a:t/>
+            </a:r>
+            <a:endParaRPr/>
+          </a:p>
+          <a:p>
+            <a:pPr indent="0" lvl="0" marL="0" rtl="0" algn="l">
+              <a:spcBef>
+                <a:spcPts val="0"/>
+              </a:spcBef>
+              <a:spcAft>
+                <a:spcPts val="0"/>
+              </a:spcAft>
+              <a:buNone/>
+            </a:pPr>
+            <a:r>
+              <a:rPr lang="zh-TW"/>
+              <a:t>In contrast, validation loss and accuracy metrics are calculated after the model has processed the entire dataset. At this point, the network has undergone complete training, resulting in the calculation of these scores.</a:t>
+            </a:r>
+            <a:endParaRPr/>
+          </a:p>
+          <a:p>
+            <a:pPr indent="0" lvl="0" marL="0" rtl="0" algn="l">
+              <a:spcBef>
+                <a:spcPts val="0"/>
+              </a:spcBef>
+              <a:spcAft>
+                <a:spcPts val="0"/>
+              </a:spcAft>
+              <a:buNone/>
+            </a:pPr>
+            <a:r>
+              <a:rPr lang="zh-TW"/>
+              <a:t>While this difference can be puzzling at first, it is not a significant concern in practice, and it is typically not a cause for worry.</a:t>
+            </a:r>
+            <a:endParaRPr/>
+          </a:p>
+          <a:p>
+            <a:pPr indent="0" lvl="0" marL="0" rtl="0" algn="l">
+              <a:spcBef>
+                <a:spcPts val="0"/>
+              </a:spcBef>
+              <a:spcAft>
+                <a:spcPts val="0"/>
+              </a:spcAft>
+              <a:buNone/>
+            </a:pPr>
+            <a:r>
+              <a:t/>
+            </a:r>
+            <a:endParaRPr/>
+          </a:p>
+          <a:p>
+            <a:pPr indent="0" lvl="0" marL="0" rtl="0" algn="l">
+              <a:spcBef>
+                <a:spcPts val="0"/>
+              </a:spcBef>
+              <a:spcAft>
+                <a:spcPts val="0"/>
+              </a:spcAft>
+              <a:buClr>
+                <a:schemeClr val="dk1"/>
+              </a:buClr>
+              <a:buSzPts val="1100"/>
+              <a:buFont typeface="Arial"/>
+              <a:buNone/>
+            </a:pPr>
+            <a:r>
+              <a:rPr lang="zh-TW"/>
+              <a:t>After implementing data augmentation, we observed improved results using the same training data.</a:t>
+            </a:r>
+            <a:endParaRPr/>
+          </a:p>
+          <a:p>
+            <a:pPr indent="0" lvl="0" marL="0" rtl="0" algn="l">
+              <a:spcBef>
+                <a:spcPts val="0"/>
+              </a:spcBef>
+              <a:spcAft>
+                <a:spcPts val="0"/>
+              </a:spcAft>
+              <a:buNone/>
+            </a:pPr>
+            <a:r>
               <a:t/>
             </a:r>
             <a:endParaRPr/>
@@ -1806,7 +1917,7 @@
   <p:cSld>
     <p:spTree>
       <p:nvGrpSpPr>
-        <p:cNvPr id="246" name="Shape 246"/>
+        <p:cNvPr id="237" name="Shape 237"/>
         <p:cNvGrpSpPr/>
         <p:nvPr/>
       </p:nvGrpSpPr>
@@ -1820,7 +1931,7 @@
       </p:grpSpPr>
       <p:sp>
         <p:nvSpPr>
-          <p:cNvPr id="247" name="Google Shape;247;g2663b6d6e7b_0_948:notes"/>
+          <p:cNvPr id="238" name="Google Shape;238;g2663b6d6e7b_0_942:notes"/>
           <p:cNvSpPr/>
           <p:nvPr>
             <p:ph idx="2" type="sldImg"/>
@@ -1855,7 +1966,7 @@
       </p:sp>
       <p:sp>
         <p:nvSpPr>
-          <p:cNvPr id="248" name="Google Shape;248;g2663b6d6e7b_0_948:notes"/>
+          <p:cNvPr id="239" name="Google Shape;239;g2663b6d6e7b_0_942:notes"/>
           <p:cNvSpPr txBox="1"/>
           <p:nvPr>
             <p:ph idx="1" type="body"/>
@@ -1888,35 +1999,7 @@
             <a:r>
               <a:t/>
             </a:r>
-            <a:endParaRPr sz="1050">
-              <a:solidFill>
-                <a:schemeClr val="dk1"/>
-              </a:solidFill>
-            </a:endParaRPr>
-          </a:p>
-          <a:p>
-            <a:pPr indent="0" lvl="0" marL="0" rtl="0" algn="l">
-              <a:spcBef>
-                <a:spcPts val="0"/>
-              </a:spcBef>
-              <a:spcAft>
-                <a:spcPts val="0"/>
-              </a:spcAft>
-              <a:buNone/>
-            </a:pPr>
-            <a:r>
-              <a:rPr lang="zh-TW" sz="1050">
-                <a:solidFill>
-                  <a:schemeClr val="dk1"/>
-                </a:solidFill>
-              </a:rPr>
-              <a:t>The training and validation accuracies are 70% and 85%, respectively. Similar to the previously shown results, the displayed validation accuracy appears notably better than the training accuracy for the same reasons. While the accuracy may be lower than the previous model, it still surpasses a random guess (50%), indicating the efficacy of transfer learning.</a:t>
-            </a:r>
-            <a:endParaRPr sz="1050">
-              <a:solidFill>
-                <a:schemeClr val="dk1"/>
-              </a:solidFill>
-            </a:endParaRPr>
+            <a:endParaRPr/>
           </a:p>
         </p:txBody>
       </p:sp>
@@ -1947,7 +2030,7 @@
       </p:grpSpPr>
       <p:sp>
         <p:nvSpPr>
-          <p:cNvPr id="254" name="Google Shape;254;g2663b6d6e7b_0_954:notes"/>
+          <p:cNvPr id="254" name="Google Shape;254;g2663b6d6e7b_0_948:notes"/>
           <p:cNvSpPr/>
           <p:nvPr>
             <p:ph idx="2" type="sldImg"/>
@@ -1982,7 +2065,7 @@
       </p:sp>
       <p:sp>
         <p:nvSpPr>
-          <p:cNvPr id="255" name="Google Shape;255;g2663b6d6e7b_0_954:notes"/>
+          <p:cNvPr id="255" name="Google Shape;255;g2663b6d6e7b_0_948:notes"/>
           <p:cNvSpPr txBox="1"/>
           <p:nvPr>
             <p:ph idx="1" type="body"/>
@@ -2013,14 +2096,9 @@
               <a:buNone/>
             </a:pPr>
             <a:r>
-              <a:rPr lang="zh-TW">
-                <a:solidFill>
-                  <a:schemeClr val="dk1"/>
-                </a:solidFill>
-              </a:rPr>
-              <a:t>The accuracy on training and validation data are 70% and 85% respectively.</a:t>
-            </a:r>
-            <a:endParaRPr>
+              <a:t/>
+            </a:r>
+            <a:endParaRPr sz="1050">
               <a:solidFill>
                 <a:schemeClr val="dk1"/>
               </a:solidFill>
@@ -2037,38 +2115,18 @@
               <a:buNone/>
             </a:pPr>
             <a:r>
-              <a:rPr lang="zh-TW">
+              <a:rPr lang="zh-TW" sz="1050">
                 <a:solidFill>
                   <a:schemeClr val="dk1"/>
                 </a:solidFill>
               </a:rPr>
-              <a:t>The displayed validation accuracy appear significantly better than the training accuracy as showed previously,  where the same reason apply.</a:t>
-            </a:r>
-            <a:endParaRPr>
+              <a:t>The training and validation accuracies are 70% and 85%, respectively. Similar to the previously shown results, the displayed validation accuracy appears notably better than the training accuracy for the same reasons. While the accuracy may be lower than the previous model, it still surpasses a random guess (50%), indicating the efficacy of transfer learning.</a:t>
+            </a:r>
+            <a:endParaRPr sz="1050">
               <a:solidFill>
                 <a:schemeClr val="dk1"/>
               </a:solidFill>
             </a:endParaRPr>
-          </a:p>
-          <a:p>
-            <a:pPr indent="0" lvl="0" marL="0" rtl="0" algn="l">
-              <a:spcBef>
-                <a:spcPts val="0"/>
-              </a:spcBef>
-              <a:spcAft>
-                <a:spcPts val="0"/>
-              </a:spcAft>
-              <a:buNone/>
-            </a:pPr>
-            <a:r>
-              <a:rPr lang="zh-TW">
-                <a:solidFill>
-                  <a:schemeClr val="dk1"/>
-                </a:solidFill>
-              </a:rPr>
-              <a:t>Although the accuracy seems lower than the previous one, it is still considerably higher than a random guess (50%), which shows that transfer learning works well. </a:t>
-            </a:r>
-            <a:endParaRPr/>
           </a:p>
         </p:txBody>
       </p:sp>
@@ -2085,7 +2143,7 @@
   <p:cSld>
     <p:spTree>
       <p:nvGrpSpPr>
-        <p:cNvPr id="261" name="Shape 261"/>
+        <p:cNvPr id="260" name="Shape 260"/>
         <p:cNvGrpSpPr/>
         <p:nvPr/>
       </p:nvGrpSpPr>
@@ -2099,7 +2157,7 @@
       </p:grpSpPr>
       <p:sp>
         <p:nvSpPr>
-          <p:cNvPr id="262" name="Google Shape;262;g2b32b8de6d2_0_64:notes"/>
+          <p:cNvPr id="261" name="Google Shape;261;g2663b6d6e7b_0_954:notes"/>
           <p:cNvSpPr/>
           <p:nvPr>
             <p:ph idx="2" type="sldImg"/>
@@ -2134,7 +2192,7 @@
       </p:sp>
       <p:sp>
         <p:nvSpPr>
-          <p:cNvPr id="263" name="Google Shape;263;g2b32b8de6d2_0_64:notes"/>
+          <p:cNvPr id="262" name="Google Shape;262;g2663b6d6e7b_0_954:notes"/>
           <p:cNvSpPr txBox="1"/>
           <p:nvPr>
             <p:ph idx="1" type="body"/>
@@ -2162,18 +2220,21 @@
               <a:spcAft>
                 <a:spcPts val="0"/>
               </a:spcAft>
-              <a:buClr>
+              <a:buNone/>
+            </a:pPr>
+            <a:r>
+              <a:rPr lang="zh-TW">
+                <a:solidFill>
+                  <a:schemeClr val="dk1"/>
+                </a:solidFill>
+              </a:rPr>
+              <a:t>The accuracy on training and validation data are 70% and 85% respectively.</a:t>
+            </a:r>
+            <a:endParaRPr>
+              <a:solidFill>
                 <a:schemeClr val="dk1"/>
-              </a:buClr>
-              <a:buSzPts val="1100"/>
-              <a:buFont typeface="Arial"/>
-              <a:buNone/>
-            </a:pPr>
-            <a:r>
-              <a:rPr lang="zh-TW"/>
-              <a:t>We have evaluated two well-known pre-trained models, ResNet50 and Xception. The "Random" classifier, operating as a completely random predictor, generates predictions with a 50/50 split between rural and urban classes.</a:t>
-            </a:r>
-            <a:endParaRPr/>
+              </a:solidFill>
+            </a:endParaRPr>
           </a:p>
           <a:p>
             <a:pPr indent="0" lvl="0" marL="0" rtl="0" algn="l">
@@ -2183,17 +2244,21 @@
               <a:spcAft>
                 <a:spcPts val="0"/>
               </a:spcAft>
-              <a:buClr>
+              <a:buNone/>
+            </a:pPr>
+            <a:r>
+              <a:rPr lang="zh-TW">
+                <a:solidFill>
+                  <a:schemeClr val="dk1"/>
+                </a:solidFill>
+              </a:rPr>
+              <a:t>The displayed validation accuracy appear significantly better than the training accuracy as showed previously,  where the same reason apply.</a:t>
+            </a:r>
+            <a:endParaRPr>
+              <a:solidFill>
                 <a:schemeClr val="dk1"/>
-              </a:buClr>
-              <a:buSzPts val="1100"/>
-              <a:buFont typeface="Arial"/>
-              <a:buNone/>
-            </a:pPr>
-            <a:r>
-              <a:t/>
-            </a:r>
-            <a:endParaRPr/>
+              </a:solidFill>
+            </a:endParaRPr>
           </a:p>
           <a:p>
             <a:pPr indent="0" lvl="0" marL="0" rtl="0" algn="l">
@@ -2203,103 +2268,15 @@
               <a:spcAft>
                 <a:spcPts val="0"/>
               </a:spcAft>
-              <a:buClr>
-                <a:schemeClr val="dk1"/>
-              </a:buClr>
-              <a:buSzPts val="1100"/>
-              <a:buFont typeface="Arial"/>
               <a:buNone/>
             </a:pPr>
             <a:r>
-              <a:rPr lang="zh-TW"/>
-              <a:t>For ResNet, the accuracy on the training and validation data is approximately 90% and 100%, respectively, raising concerns about potential overfitting. It is anticipated that the accuracy for ResNet will decrease with an increase in the training data.</a:t>
-            </a:r>
-            <a:endParaRPr/>
-          </a:p>
-          <a:p>
-            <a:pPr indent="0" lvl="0" marL="0" rtl="0" algn="l">
-              <a:spcBef>
-                <a:spcPts val="0"/>
-              </a:spcBef>
-              <a:spcAft>
-                <a:spcPts val="0"/>
-              </a:spcAft>
-              <a:buClr>
-                <a:schemeClr val="dk1"/>
-              </a:buClr>
-              <a:buSzPts val="1100"/>
-              <a:buFont typeface="Arial"/>
-              <a:buNone/>
-            </a:pPr>
-            <a:r>
-              <a:t/>
-            </a:r>
-            <a:endParaRPr/>
-          </a:p>
-          <a:p>
-            <a:pPr indent="0" lvl="0" marL="0" rtl="0" algn="l">
-              <a:spcBef>
-                <a:spcPts val="0"/>
-              </a:spcBef>
-              <a:spcAft>
-                <a:spcPts val="0"/>
-              </a:spcAft>
-              <a:buNone/>
-            </a:pPr>
-            <a:r>
-              <a:rPr lang="zh-TW"/>
-              <a:t>For Xception, the accuracy on the training and validation data is approximately 71% and 85%, respectively. While this accuracy might seem lower than ResNet, it significantly surpasses a random guess (50%), showcasing the efficacy of transfer learning. Given the relatively small size of the training dataset, an improvement in accuracy is anticipated with an increase in training data.</a:t>
-            </a:r>
-            <a:endParaRPr/>
-          </a:p>
-          <a:p>
-            <a:pPr indent="0" lvl="0" marL="0" rtl="0" algn="l">
-              <a:spcBef>
-                <a:spcPts val="0"/>
-              </a:spcBef>
-              <a:spcAft>
-                <a:spcPts val="0"/>
-              </a:spcAft>
-              <a:buNone/>
-            </a:pPr>
-            <a:r>
-              <a:t/>
-            </a:r>
-            <a:endParaRPr/>
-          </a:p>
-          <a:p>
-            <a:pPr indent="0" lvl="0" marL="0" rtl="0" algn="l">
-              <a:spcBef>
-                <a:spcPts val="0"/>
-              </a:spcBef>
-              <a:spcAft>
-                <a:spcPts val="0"/>
-              </a:spcAft>
-              <a:buClr>
-                <a:schemeClr val="dk1"/>
-              </a:buClr>
-              <a:buSzPts val="1100"/>
-              <a:buFont typeface="Arial"/>
-              <a:buNone/>
-            </a:pPr>
-            <a:r>
-              <a:rPr lang="zh-TW"/>
-              <a:t>Nevertheless, the performance achieved is quite remarkable considering the limited size of the dataset.</a:t>
-            </a:r>
-            <a:endParaRPr/>
-          </a:p>
-          <a:p>
-            <a:pPr indent="0" lvl="0" marL="0" rtl="0" algn="l">
-              <a:spcBef>
-                <a:spcPts val="0"/>
-              </a:spcBef>
-              <a:spcAft>
-                <a:spcPts val="0"/>
-              </a:spcAft>
-              <a:buNone/>
-            </a:pPr>
-            <a:r>
-              <a:t/>
+              <a:rPr lang="zh-TW">
+                <a:solidFill>
+                  <a:schemeClr val="dk1"/>
+                </a:solidFill>
+              </a:rPr>
+              <a:t>Although the accuracy seems lower than the previous one, it is still considerably higher than a random guess (50%), which shows that transfer learning works well. </a:t>
             </a:r>
             <a:endParaRPr/>
           </a:p>
@@ -2431,7 +2408,7 @@
   <p:cSld>
     <p:spTree>
       <p:nvGrpSpPr>
-        <p:cNvPr id="267" name="Shape 267"/>
+        <p:cNvPr id="268" name="Shape 268"/>
         <p:cNvGrpSpPr/>
         <p:nvPr/>
       </p:nvGrpSpPr>
@@ -2445,7 +2422,7 @@
       </p:grpSpPr>
       <p:sp>
         <p:nvSpPr>
-          <p:cNvPr id="268" name="Google Shape;268;g2663b6d6e7b_0_681:notes"/>
+          <p:cNvPr id="269" name="Google Shape;269;g2b32b8de6d2_0_64:notes"/>
           <p:cNvSpPr/>
           <p:nvPr>
             <p:ph idx="2" type="sldImg"/>
@@ -2480,7 +2457,7 @@
       </p:sp>
       <p:sp>
         <p:nvSpPr>
-          <p:cNvPr id="269" name="Google Shape;269;g2663b6d6e7b_0_681:notes"/>
+          <p:cNvPr id="270" name="Google Shape;270;g2b32b8de6d2_0_64:notes"/>
           <p:cNvSpPr txBox="1"/>
           <p:nvPr>
             <p:ph idx="1" type="body"/>
@@ -2508,6 +2485,140 @@
               <a:spcAft>
                 <a:spcPts val="0"/>
               </a:spcAft>
+              <a:buClr>
+                <a:schemeClr val="dk1"/>
+              </a:buClr>
+              <a:buSzPts val="1100"/>
+              <a:buFont typeface="Arial"/>
+              <a:buNone/>
+            </a:pPr>
+            <a:r>
+              <a:rPr lang="zh-TW"/>
+              <a:t>We have evaluated two well-known pre-trained models, ResNet50 and Xception. The "Random" classifier, operating as a completely random predictor, generates predictions with a 50/50 split between rural and urban classes.</a:t>
+            </a:r>
+            <a:endParaRPr/>
+          </a:p>
+          <a:p>
+            <a:pPr indent="0" lvl="0" marL="0" rtl="0" algn="l">
+              <a:spcBef>
+                <a:spcPts val="0"/>
+              </a:spcBef>
+              <a:spcAft>
+                <a:spcPts val="0"/>
+              </a:spcAft>
+              <a:buClr>
+                <a:schemeClr val="dk1"/>
+              </a:buClr>
+              <a:buSzPts val="1100"/>
+              <a:buFont typeface="Arial"/>
+              <a:buNone/>
+            </a:pPr>
+            <a:r>
+              <a:t/>
+            </a:r>
+            <a:endParaRPr/>
+          </a:p>
+          <a:p>
+            <a:pPr indent="0" lvl="0" marL="0" rtl="0" algn="l">
+              <a:spcBef>
+                <a:spcPts val="0"/>
+              </a:spcBef>
+              <a:spcAft>
+                <a:spcPts val="0"/>
+              </a:spcAft>
+              <a:buClr>
+                <a:schemeClr val="dk1"/>
+              </a:buClr>
+              <a:buSzPts val="1100"/>
+              <a:buFont typeface="Arial"/>
+              <a:buNone/>
+            </a:pPr>
+            <a:r>
+              <a:rPr lang="zh-TW"/>
+              <a:t>For ResNet, the accuracy on the training and validation data is approximately 90% and 100%, respectively, raising concerns about potential overfitting. It is anticipated that the accuracy for ResNet will decrease with an increase in the training data.</a:t>
+            </a:r>
+            <a:endParaRPr/>
+          </a:p>
+          <a:p>
+            <a:pPr indent="0" lvl="0" marL="0" rtl="0" algn="l">
+              <a:spcBef>
+                <a:spcPts val="0"/>
+              </a:spcBef>
+              <a:spcAft>
+                <a:spcPts val="0"/>
+              </a:spcAft>
+              <a:buClr>
+                <a:schemeClr val="dk1"/>
+              </a:buClr>
+              <a:buSzPts val="1100"/>
+              <a:buFont typeface="Arial"/>
+              <a:buNone/>
+            </a:pPr>
+            <a:r>
+              <a:t/>
+            </a:r>
+            <a:endParaRPr/>
+          </a:p>
+          <a:p>
+            <a:pPr indent="0" lvl="0" marL="0" rtl="0" algn="l">
+              <a:spcBef>
+                <a:spcPts val="0"/>
+              </a:spcBef>
+              <a:spcAft>
+                <a:spcPts val="0"/>
+              </a:spcAft>
+              <a:buNone/>
+            </a:pPr>
+            <a:r>
+              <a:rPr lang="zh-TW"/>
+              <a:t>For Xception, the accuracy on the training and validation data is approximately 71% and 85%, respectively. While this accuracy might seem lower than ResNet, it significantly surpasses a random guess (50%), showcasing the efficacy of transfer learning. Given the relatively small size of the training dataset, an improvement in accuracy is anticipated with an increase in training data.</a:t>
+            </a:r>
+            <a:endParaRPr/>
+          </a:p>
+          <a:p>
+            <a:pPr indent="0" lvl="0" marL="0" rtl="0" algn="l">
+              <a:spcBef>
+                <a:spcPts val="0"/>
+              </a:spcBef>
+              <a:spcAft>
+                <a:spcPts val="0"/>
+              </a:spcAft>
+              <a:buNone/>
+            </a:pPr>
+            <a:r>
+              <a:t/>
+            </a:r>
+            <a:endParaRPr/>
+          </a:p>
+          <a:p>
+            <a:pPr indent="0" lvl="0" marL="0" rtl="0" algn="l">
+              <a:spcBef>
+                <a:spcPts val="0"/>
+              </a:spcBef>
+              <a:spcAft>
+                <a:spcPts val="0"/>
+              </a:spcAft>
+              <a:buClr>
+                <a:schemeClr val="dk1"/>
+              </a:buClr>
+              <a:buSzPts val="1100"/>
+              <a:buFont typeface="Arial"/>
+              <a:buNone/>
+            </a:pPr>
+            <a:r>
+              <a:rPr lang="zh-TW"/>
+              <a:t>Nevertheless, the performance achieved is quite remarkable considering the limited size of the dataset.</a:t>
+            </a:r>
+            <a:endParaRPr/>
+          </a:p>
+          <a:p>
+            <a:pPr indent="0" lvl="0" marL="0" rtl="0" algn="l">
+              <a:spcBef>
+                <a:spcPts val="0"/>
+              </a:spcBef>
+              <a:spcAft>
+                <a:spcPts val="0"/>
+              </a:spcAft>
               <a:buNone/>
             </a:pPr>
             <a:r>
@@ -2530,7 +2641,7 @@
   <p:cSld>
     <p:spTree>
       <p:nvGrpSpPr>
-        <p:cNvPr id="273" name="Shape 273"/>
+        <p:cNvPr id="274" name="Shape 274"/>
         <p:cNvGrpSpPr/>
         <p:nvPr/>
       </p:nvGrpSpPr>
@@ -2544,7 +2655,7 @@
       </p:grpSpPr>
       <p:sp>
         <p:nvSpPr>
-          <p:cNvPr id="274" name="Google Shape;274;g2663b6d6e7b_0_686:notes"/>
+          <p:cNvPr id="275" name="Google Shape;275;g2663b6d6e7b_0_681:notes"/>
           <p:cNvSpPr/>
           <p:nvPr>
             <p:ph idx="2" type="sldImg"/>
@@ -2579,7 +2690,7 @@
       </p:sp>
       <p:sp>
         <p:nvSpPr>
-          <p:cNvPr id="275" name="Google Shape;275;g2663b6d6e7b_0_686:notes"/>
+          <p:cNvPr id="276" name="Google Shape;276;g2663b6d6e7b_0_681:notes"/>
           <p:cNvSpPr txBox="1"/>
           <p:nvPr>
             <p:ph idx="1" type="body"/>
@@ -2629,7 +2740,7 @@
   <p:cSld>
     <p:spTree>
       <p:nvGrpSpPr>
-        <p:cNvPr id="279" name="Shape 279"/>
+        <p:cNvPr id="280" name="Shape 280"/>
         <p:cNvGrpSpPr/>
         <p:nvPr/>
       </p:nvGrpSpPr>
@@ -2643,7 +2754,7 @@
       </p:grpSpPr>
       <p:sp>
         <p:nvSpPr>
-          <p:cNvPr id="280" name="Google Shape;280;g2663b6d6e7b_0_691:notes"/>
+          <p:cNvPr id="281" name="Google Shape;281;g2663b6d6e7b_0_686:notes"/>
           <p:cNvSpPr/>
           <p:nvPr>
             <p:ph idx="2" type="sldImg"/>
@@ -2678,7 +2789,7 @@
       </p:sp>
       <p:sp>
         <p:nvSpPr>
-          <p:cNvPr id="281" name="Google Shape;281;g2663b6d6e7b_0_691:notes"/>
+          <p:cNvPr id="282" name="Google Shape;282;g2663b6d6e7b_0_686:notes"/>
           <p:cNvSpPr txBox="1"/>
           <p:nvPr>
             <p:ph idx="1" type="body"/>
@@ -2728,7 +2839,7 @@
   <p:cSld>
     <p:spTree>
       <p:nvGrpSpPr>
-        <p:cNvPr id="285" name="Shape 285"/>
+        <p:cNvPr id="286" name="Shape 286"/>
         <p:cNvGrpSpPr/>
         <p:nvPr/>
       </p:nvGrpSpPr>
@@ -2742,7 +2853,7 @@
       </p:grpSpPr>
       <p:sp>
         <p:nvSpPr>
-          <p:cNvPr id="286" name="Google Shape;286;g2663b6d6e7b_0_696:notes"/>
+          <p:cNvPr id="287" name="Google Shape;287;g2663b6d6e7b_0_691:notes"/>
           <p:cNvSpPr/>
           <p:nvPr>
             <p:ph idx="2" type="sldImg"/>
@@ -2777,7 +2888,106 @@
       </p:sp>
       <p:sp>
         <p:nvSpPr>
-          <p:cNvPr id="287" name="Google Shape;287;g2663b6d6e7b_0_696:notes"/>
+          <p:cNvPr id="288" name="Google Shape;288;g2663b6d6e7b_0_691:notes"/>
+          <p:cNvSpPr txBox="1"/>
+          <p:nvPr>
+            <p:ph idx="1" type="body"/>
+          </p:nvPr>
+        </p:nvSpPr>
+        <p:spPr>
+          <a:xfrm>
+            <a:off x="685800" y="4343400"/>
+            <a:ext cx="5486400" cy="4114800"/>
+          </a:xfrm>
+          <a:prstGeom prst="rect">
+            <a:avLst/>
+          </a:prstGeom>
+        </p:spPr>
+        <p:txBody>
+          <a:bodyPr anchorCtr="0" anchor="t" bIns="91425" lIns="91425" spcFirstLastPara="1" rIns="91425" wrap="square" tIns="91425">
+            <a:noAutofit/>
+          </a:bodyPr>
+          <a:lstStyle/>
+          <a:p>
+            <a:pPr indent="0" lvl="0" marL="0" rtl="0" algn="l">
+              <a:spcBef>
+                <a:spcPts val="0"/>
+              </a:spcBef>
+              <a:spcAft>
+                <a:spcPts val="0"/>
+              </a:spcAft>
+              <a:buNone/>
+            </a:pPr>
+            <a:r>
+              <a:t/>
+            </a:r>
+            <a:endParaRPr/>
+          </a:p>
+        </p:txBody>
+      </p:sp>
+    </p:spTree>
+  </p:cSld>
+  <p:clrMapOvr>
+    <a:masterClrMapping/>
+  </p:clrMapOvr>
+</p:notes>
+</file>
+
+<file path=ppt/notesSlides/notesSlide24.xml><?xml version="1.0" encoding="utf-8"?>
+<p:notes xmlns:a="http://schemas.openxmlformats.org/drawingml/2006/main" xmlns:r="http://schemas.openxmlformats.org/officeDocument/2006/relationships" xmlns:mc="http://schemas.openxmlformats.org/markup-compatibility/2006" xmlns:mv="urn:schemas-microsoft-com:mac:vml" xmlns:p="http://schemas.openxmlformats.org/presentationml/2006/main" xmlns:c="http://schemas.openxmlformats.org/drawingml/2006/chart" xmlns:dgm="http://schemas.openxmlformats.org/drawingml/2006/diagram" xmlns:o="urn:schemas-microsoft-com:office:office" xmlns:v="urn:schemas-microsoft-com:vml" xmlns:pvml="urn:schemas-microsoft-com:office:powerpoint" xmlns:com="http://schemas.openxmlformats.org/drawingml/2006/compatibility" xmlns:p14="http://schemas.microsoft.com/office/powerpoint/2010/main" xmlns:p15="http://schemas.microsoft.com/office/powerpoint/2012/main" xmlns:ahyp="http://schemas.microsoft.com/office/drawing/2018/hyperlinkcolor" showMasterPhAnim="0" showMasterSp="0">
+  <p:cSld>
+    <p:spTree>
+      <p:nvGrpSpPr>
+        <p:cNvPr id="292" name="Shape 292"/>
+        <p:cNvGrpSpPr/>
+        <p:nvPr/>
+      </p:nvGrpSpPr>
+      <p:grpSpPr>
+        <a:xfrm>
+          <a:off x="0" y="0"/>
+          <a:ext cx="0" cy="0"/>
+          <a:chOff x="0" y="0"/>
+          <a:chExt cx="0" cy="0"/>
+        </a:xfrm>
+      </p:grpSpPr>
+      <p:sp>
+        <p:nvSpPr>
+          <p:cNvPr id="293" name="Google Shape;293;g2663b6d6e7b_0_696:notes"/>
+          <p:cNvSpPr/>
+          <p:nvPr>
+            <p:ph idx="2" type="sldImg"/>
+          </p:nvPr>
+        </p:nvSpPr>
+        <p:spPr>
+          <a:xfrm>
+            <a:off x="381300" y="685800"/>
+            <a:ext cx="6096000" cy="3429000"/>
+          </a:xfrm>
+          <a:custGeom>
+            <a:rect b="b" l="l" r="r" t="t"/>
+            <a:pathLst>
+              <a:path extrusionOk="0" h="120000" w="120000">
+                <a:moveTo>
+                  <a:pt x="0" y="0"/>
+                </a:moveTo>
+                <a:lnTo>
+                  <a:pt x="120000" y="0"/>
+                </a:lnTo>
+                <a:lnTo>
+                  <a:pt x="120000" y="120000"/>
+                </a:lnTo>
+                <a:lnTo>
+                  <a:pt x="0" y="120000"/>
+                </a:lnTo>
+                <a:close/>
+              </a:path>
+            </a:pathLst>
+          </a:custGeom>
+        </p:spPr>
+      </p:sp>
+      <p:sp>
+        <p:nvSpPr>
+          <p:cNvPr id="294" name="Google Shape;294;g2663b6d6e7b_0_696:notes"/>
           <p:cNvSpPr txBox="1"/>
           <p:nvPr>
             <p:ph idx="1" type="body"/>
@@ -3245,16 +3455,7 @@
               <a:buNone/>
             </a:pPr>
             <a:r>
-              <a:rPr lang="zh-TW" sz="1200">
-                <a:solidFill>
-                  <a:schemeClr val="dk1"/>
-                </a:solidFill>
-                <a:latin typeface="Calibri"/>
-                <a:ea typeface="Calibri"/>
-                <a:cs typeface="Calibri"/>
-                <a:sym typeface="Calibri"/>
-              </a:rPr>
-              <a:t>For this dataset, feature engineering is straightforward as there are no missing data or outliers. All floating-point values fall within the range of -1 to 1, eliminating the need for scaling. However, PCA can be applied to reduce dimensions since some features exhibit high correlation.</a:t>
+              <a:t/>
             </a:r>
             <a:endParaRPr/>
           </a:p>
@@ -3386,7 +3587,7 @@
       </p:grpSpPr>
       <p:sp>
         <p:nvSpPr>
-          <p:cNvPr id="168" name="Google Shape;168;g2b32b8de6d2_0_71:notes"/>
+          <p:cNvPr id="168" name="Google Shape;168;g2b3a093d9cf_0_0:notes"/>
           <p:cNvSpPr/>
           <p:nvPr>
             <p:ph idx="2" type="sldImg"/>
@@ -3421,7 +3622,7 @@
       </p:sp>
       <p:sp>
         <p:nvSpPr>
-          <p:cNvPr id="169" name="Google Shape;169;g2b32b8de6d2_0_71:notes"/>
+          <p:cNvPr id="169" name="Google Shape;169;g2b3a093d9cf_0_0:notes"/>
           <p:cNvSpPr txBox="1"/>
           <p:nvPr>
             <p:ph idx="1" type="body"/>
@@ -3441,47 +3642,6 @@
             <a:noAutofit/>
           </a:bodyPr>
           <a:lstStyle/>
-          <a:p>
-            <a:pPr indent="0" lvl="0" marL="0" rtl="0" algn="l">
-              <a:spcBef>
-                <a:spcPts val="0"/>
-              </a:spcBef>
-              <a:spcAft>
-                <a:spcPts val="0"/>
-              </a:spcAft>
-              <a:buClr>
-                <a:schemeClr val="dk1"/>
-              </a:buClr>
-              <a:buSzPts val="1100"/>
-              <a:buFont typeface="Arial"/>
-              <a:buNone/>
-            </a:pPr>
-            <a:r>
-              <a:rPr lang="zh-TW"/>
-              <a:t>The dataset is divided into training data, comprising 36 images for each urban and rural scene, and a test set, which incorporates 10 images for each category. The labeling is based on the directory names of the respective image files.</a:t>
-            </a:r>
-            <a:endParaRPr/>
-          </a:p>
-          <a:p>
-            <a:pPr indent="0" lvl="0" marL="0" rtl="0" algn="l">
-              <a:spcBef>
-                <a:spcPts val="0"/>
-              </a:spcBef>
-              <a:spcAft>
-                <a:spcPts val="0"/>
-              </a:spcAft>
-              <a:buClr>
-                <a:schemeClr val="dk1"/>
-              </a:buClr>
-              <a:buSzPts val="1100"/>
-              <a:buFont typeface="Arial"/>
-              <a:buNone/>
-            </a:pPr>
-            <a:r>
-              <a:t/>
-            </a:r>
-            <a:endParaRPr/>
-          </a:p>
           <a:p>
             <a:pPr indent="0" lvl="0" marL="0" rtl="0" algn="l">
               <a:spcBef>
@@ -3526,7 +3686,7 @@
       </p:grpSpPr>
       <p:sp>
         <p:nvSpPr>
-          <p:cNvPr id="175" name="Google Shape;175;g2663b6d6e7b_0_894:notes"/>
+          <p:cNvPr id="175" name="Google Shape;175;g2b32b8de6d2_0_71:notes"/>
           <p:cNvSpPr/>
           <p:nvPr>
             <p:ph idx="2" type="sldImg"/>
@@ -3561,7 +3721,7 @@
       </p:sp>
       <p:sp>
         <p:nvSpPr>
-          <p:cNvPr id="176" name="Google Shape;176;g2663b6d6e7b_0_894:notes"/>
+          <p:cNvPr id="176" name="Google Shape;176;g2b32b8de6d2_0_71:notes"/>
           <p:cNvSpPr txBox="1"/>
           <p:nvPr>
             <p:ph idx="1" type="body"/>
@@ -3597,26 +3757,10 @@
               <a:buNone/>
             </a:pPr>
             <a:r>
-              <a:rPr lang="zh-TW" sz="1200">
-                <a:solidFill>
-                  <a:srgbClr val="434343"/>
-                </a:solidFill>
-                <a:latin typeface="Roboto"/>
-                <a:ea typeface="Roboto"/>
-                <a:cs typeface="Roboto"/>
-                <a:sym typeface="Roboto"/>
-              </a:rPr>
-              <a:t>Data augmentation presents a cost-effective and efficient method for enhancing the performance and precision of machine learning models, especially in situations with limited data availability. To boost the representation of the "cat" class, one can replicate cat images and mirror them horizontally. Additional modifications, such as rotation, cropping, and translation, can also be applied.</a:t>
-            </a:r>
-            <a:endParaRPr sz="1200">
-              <a:solidFill>
-                <a:srgbClr val="434343"/>
-              </a:solidFill>
-              <a:latin typeface="Roboto"/>
-              <a:ea typeface="Roboto"/>
-              <a:cs typeface="Roboto"/>
-              <a:sym typeface="Roboto"/>
-            </a:endParaRPr>
+              <a:rPr lang="zh-TW"/>
+              <a:t>The dataset is divided into training data, comprising 36 images for each urban and rural scene, and a test set, which incorporates 10 images for each category. The labeling is based on the directory names of the respective image files.</a:t>
+            </a:r>
+            <a:endParaRPr/>
           </a:p>
           <a:p>
             <a:pPr indent="0" lvl="0" marL="0" rtl="0" algn="l">
@@ -3636,15 +3780,7 @@
             <a:r>
               <a:t/>
             </a:r>
-            <a:endParaRPr sz="1200">
-              <a:solidFill>
-                <a:srgbClr val="434343"/>
-              </a:solidFill>
-              <a:latin typeface="Roboto"/>
-              <a:ea typeface="Roboto"/>
-              <a:cs typeface="Roboto"/>
-              <a:sym typeface="Roboto"/>
-            </a:endParaRPr>
+            <a:endParaRPr/>
           </a:p>
           <a:p>
             <a:pPr indent="0" lvl="0" marL="0" rtl="0" algn="l">
@@ -3654,57 +3790,12 @@
               <a:spcAft>
                 <a:spcPts val="0"/>
               </a:spcAft>
-              <a:buClr>
-                <a:schemeClr val="dk1"/>
-              </a:buClr>
-              <a:buSzPts val="1100"/>
-              <a:buFont typeface="Arial"/>
               <a:buNone/>
             </a:pPr>
             <a:r>
-              <a:rPr lang="zh-TW" sz="1200">
-                <a:solidFill>
-                  <a:srgbClr val="434343"/>
-                </a:solidFill>
-                <a:latin typeface="Roboto"/>
-                <a:ea typeface="Roboto"/>
-                <a:cs typeface="Roboto"/>
-                <a:sym typeface="Roboto"/>
-              </a:rPr>
-              <a:t>In our specific scenario, unrestricted rotation is not feasible due to the necessity for the building to maintain an upright appearance. Nevertheless, horizontal flipping and cropping remains a viable option. Furthermore, simulating varying weather conditions by adjusting image brightness can contribute to the generation of augmented data, offering the model exposure to diverse environmental factors.</a:t>
-            </a:r>
-            <a:endParaRPr sz="1200">
-              <a:solidFill>
-                <a:srgbClr val="434343"/>
-              </a:solidFill>
-              <a:latin typeface="Roboto"/>
-              <a:ea typeface="Roboto"/>
-              <a:cs typeface="Roboto"/>
-              <a:sym typeface="Roboto"/>
-            </a:endParaRPr>
-          </a:p>
-          <a:p>
-            <a:pPr indent="0" lvl="0" marL="0" rtl="0" algn="l">
-              <a:spcBef>
-                <a:spcPts val="0"/>
-              </a:spcBef>
-              <a:spcAft>
-                <a:spcPts val="0"/>
-              </a:spcAft>
-              <a:buNone/>
-            </a:pPr>
-            <a:r>
               <a:t/>
             </a:r>
-            <a:endParaRPr sz="1200">
-              <a:solidFill>
-                <a:srgbClr val="434343"/>
-              </a:solidFill>
-              <a:latin typeface="Roboto"/>
-              <a:ea typeface="Roboto"/>
-              <a:cs typeface="Roboto"/>
-              <a:sym typeface="Roboto"/>
-            </a:endParaRPr>
+            <a:endParaRPr/>
           </a:p>
         </p:txBody>
       </p:sp>
@@ -10550,6 +10641,212 @@
             </a:pPr>
             <a:r>
               <a:rPr lang="zh-TW"/>
+              <a:t>Data augmentation</a:t>
+            </a:r>
+            <a:endParaRPr/>
+          </a:p>
+        </p:txBody>
+      </p:sp>
+      <p:pic>
+        <p:nvPicPr>
+          <p:cNvPr id="186" name="Google Shape;186;p22"/>
+          <p:cNvPicPr preferRelativeResize="0"/>
+          <p:nvPr/>
+        </p:nvPicPr>
+        <p:blipFill>
+          <a:blip r:embed="rId3">
+            <a:alphaModFix/>
+          </a:blip>
+          <a:stretch>
+            <a:fillRect/>
+          </a:stretch>
+        </p:blipFill>
+        <p:spPr>
+          <a:xfrm>
+            <a:off x="3256475" y="1219363"/>
+            <a:ext cx="5191100" cy="2704775"/>
+          </a:xfrm>
+          <a:prstGeom prst="rect">
+            <a:avLst/>
+          </a:prstGeom>
+          <a:noFill/>
+          <a:ln>
+            <a:noFill/>
+          </a:ln>
+        </p:spPr>
+      </p:pic>
+      <p:sp>
+        <p:nvSpPr>
+          <p:cNvPr id="187" name="Google Shape;187;p22"/>
+          <p:cNvSpPr txBox="1"/>
+          <p:nvPr/>
+        </p:nvSpPr>
+        <p:spPr>
+          <a:xfrm>
+            <a:off x="505850" y="1219350"/>
+            <a:ext cx="2699100" cy="2401200"/>
+          </a:xfrm>
+          <a:prstGeom prst="rect">
+            <a:avLst/>
+          </a:prstGeom>
+          <a:noFill/>
+          <a:ln>
+            <a:noFill/>
+          </a:ln>
+        </p:spPr>
+        <p:txBody>
+          <a:bodyPr anchorCtr="0" anchor="t" bIns="91425" lIns="91425" spcFirstLastPara="1" rIns="91425" wrap="square" tIns="91425">
+            <a:spAutoFit/>
+          </a:bodyPr>
+          <a:lstStyle/>
+          <a:p>
+            <a:pPr indent="0" lvl="0" marL="0" rtl="0" algn="l">
+              <a:spcBef>
+                <a:spcPts val="0"/>
+              </a:spcBef>
+              <a:spcAft>
+                <a:spcPts val="0"/>
+              </a:spcAft>
+              <a:buNone/>
+            </a:pPr>
+            <a:r>
+              <a:rPr lang="zh-TW" sz="1200">
+                <a:solidFill>
+                  <a:schemeClr val="dk2"/>
+                </a:solidFill>
+                <a:latin typeface="Roboto"/>
+                <a:ea typeface="Roboto"/>
+                <a:cs typeface="Roboto"/>
+                <a:sym typeface="Roboto"/>
+              </a:rPr>
+              <a:t>Data augmentation is a low-cost and effective approach to improving the performance and accuracy of machine learning models in data-constrained scenarios.</a:t>
+            </a:r>
+            <a:endParaRPr sz="1200">
+              <a:solidFill>
+                <a:schemeClr val="dk2"/>
+              </a:solidFill>
+              <a:latin typeface="Roboto"/>
+              <a:ea typeface="Roboto"/>
+              <a:cs typeface="Roboto"/>
+              <a:sym typeface="Roboto"/>
+            </a:endParaRPr>
+          </a:p>
+          <a:p>
+            <a:pPr indent="0" lvl="0" marL="0" rtl="0" algn="l">
+              <a:spcBef>
+                <a:spcPts val="0"/>
+              </a:spcBef>
+              <a:spcAft>
+                <a:spcPts val="0"/>
+              </a:spcAft>
+              <a:buNone/>
+            </a:pPr>
+            <a:r>
+              <a:t/>
+            </a:r>
+            <a:endParaRPr sz="1200">
+              <a:solidFill>
+                <a:schemeClr val="dk2"/>
+              </a:solidFill>
+              <a:latin typeface="Roboto"/>
+              <a:ea typeface="Roboto"/>
+              <a:cs typeface="Roboto"/>
+              <a:sym typeface="Roboto"/>
+            </a:endParaRPr>
+          </a:p>
+          <a:p>
+            <a:pPr indent="0" lvl="0" marL="0" rtl="0" algn="l">
+              <a:spcBef>
+                <a:spcPts val="0"/>
+              </a:spcBef>
+              <a:spcAft>
+                <a:spcPts val="0"/>
+              </a:spcAft>
+              <a:buNone/>
+            </a:pPr>
+            <a:r>
+              <a:rPr lang="zh-TW" sz="1200">
+                <a:solidFill>
+                  <a:schemeClr val="dk2"/>
+                </a:solidFill>
+                <a:latin typeface="Roboto"/>
+                <a:ea typeface="Roboto"/>
+                <a:cs typeface="Roboto"/>
+                <a:sym typeface="Roboto"/>
+              </a:rPr>
+              <a:t>In our specific scenario, unrestricted rotation is not feasible due to the necessity for the building to maintain an upright appearance. Nevertheless, horizontal flipping and cropping remains a viable option.</a:t>
+            </a:r>
+            <a:endParaRPr sz="1200">
+              <a:solidFill>
+                <a:schemeClr val="dk2"/>
+              </a:solidFill>
+              <a:latin typeface="Roboto"/>
+              <a:ea typeface="Roboto"/>
+              <a:cs typeface="Roboto"/>
+              <a:sym typeface="Roboto"/>
+            </a:endParaRPr>
+          </a:p>
+        </p:txBody>
+      </p:sp>
+    </p:spTree>
+  </p:cSld>
+  <p:clrMapOvr>
+    <a:masterClrMapping/>
+  </p:clrMapOvr>
+</p:sld>
+</file>
+
+<file path=ppt/slides/slide11.xml><?xml version="1.0" encoding="utf-8"?>
+<p:sld xmlns:a="http://schemas.openxmlformats.org/drawingml/2006/main" xmlns:r="http://schemas.openxmlformats.org/officeDocument/2006/relationships" xmlns:mc="http://schemas.openxmlformats.org/markup-compatibility/2006" xmlns:mv="urn:schemas-microsoft-com:mac:vml" xmlns:p="http://schemas.openxmlformats.org/presentationml/2006/main" xmlns:c="http://schemas.openxmlformats.org/drawingml/2006/chart" xmlns:dgm="http://schemas.openxmlformats.org/drawingml/2006/diagram" xmlns:o="urn:schemas-microsoft-com:office:office" xmlns:v="urn:schemas-microsoft-com:vml" xmlns:pvml="urn:schemas-microsoft-com:office:powerpoint" xmlns:com="http://schemas.openxmlformats.org/drawingml/2006/compatibility" xmlns:p14="http://schemas.microsoft.com/office/powerpoint/2010/main" xmlns:p15="http://schemas.microsoft.com/office/powerpoint/2012/main" xmlns:ahyp="http://schemas.microsoft.com/office/drawing/2018/hyperlinkcolor">
+  <p:cSld>
+    <p:spTree>
+      <p:nvGrpSpPr>
+        <p:cNvPr id="191" name="Shape 191"/>
+        <p:cNvGrpSpPr/>
+        <p:nvPr/>
+      </p:nvGrpSpPr>
+      <p:grpSpPr>
+        <a:xfrm>
+          <a:off x="0" y="0"/>
+          <a:ext cx="0" cy="0"/>
+          <a:chOff x="0" y="0"/>
+          <a:chExt cx="0" cy="0"/>
+        </a:xfrm>
+      </p:grpSpPr>
+      <p:sp>
+        <p:nvSpPr>
+          <p:cNvPr id="192" name="Google Shape;192;p23"/>
+          <p:cNvSpPr txBox="1"/>
+          <p:nvPr>
+            <p:ph type="title"/>
+          </p:nvPr>
+        </p:nvSpPr>
+        <p:spPr>
+          <a:xfrm>
+            <a:off x="311700" y="410000"/>
+            <a:ext cx="8520600" cy="607800"/>
+          </a:xfrm>
+          <a:prstGeom prst="rect">
+            <a:avLst/>
+          </a:prstGeom>
+        </p:spPr>
+        <p:txBody>
+          <a:bodyPr anchorCtr="0" anchor="t" bIns="91425" lIns="91425" spcFirstLastPara="1" rIns="91425" wrap="square" tIns="91425">
+            <a:normAutofit fontScale="90000"/>
+          </a:bodyPr>
+          <a:lstStyle/>
+          <a:p>
+            <a:pPr indent="0" lvl="0" marL="0" rtl="0" algn="l">
+              <a:spcBef>
+                <a:spcPts val="0"/>
+              </a:spcBef>
+              <a:spcAft>
+                <a:spcPts val="0"/>
+              </a:spcAft>
+              <a:buNone/>
+            </a:pPr>
+            <a:r>
+              <a:rPr lang="zh-TW"/>
               <a:t>Pre-trained Models</a:t>
             </a:r>
             <a:endParaRPr/>
@@ -10558,7 +10855,7 @@
       </p:sp>
       <p:sp>
         <p:nvSpPr>
-          <p:cNvPr id="186" name="Google Shape;186;p22"/>
+          <p:cNvPr id="193" name="Google Shape;193;p23"/>
           <p:cNvSpPr txBox="1"/>
           <p:nvPr>
             <p:ph idx="1" type="body"/>
@@ -10650,7 +10947,7 @@
       </p:sp>
       <p:graphicFrame>
         <p:nvGraphicFramePr>
-          <p:cNvPr id="187" name="Google Shape;187;p22"/>
+          <p:cNvPr id="194" name="Google Shape;194;p23"/>
           <p:cNvGraphicFramePr/>
           <p:nvPr/>
         </p:nvGraphicFramePr>
@@ -10663,7 +10960,7 @@
             <a:tbl>
               <a:tblPr>
                 <a:noFill/>
-                <a:tableStyleId>{BBA09A7B-91BE-4200-916E-3503C227CC42}</a:tableStyleId>
+                <a:tableStyleId>{AB49510B-4952-4A84-B414-657EA9592732}</a:tableStyleId>
               </a:tblPr>
               <a:tblGrid>
                 <a:gridCol w="594550"/>
@@ -16305,180 +16602,6 @@
 </p:sld>
 </file>
 
-<file path=ppt/slides/slide11.xml><?xml version="1.0" encoding="utf-8"?>
-<p:sld xmlns:a="http://schemas.openxmlformats.org/drawingml/2006/main" xmlns:r="http://schemas.openxmlformats.org/officeDocument/2006/relationships" xmlns:mc="http://schemas.openxmlformats.org/markup-compatibility/2006" xmlns:mv="urn:schemas-microsoft-com:mac:vml" xmlns:p="http://schemas.openxmlformats.org/presentationml/2006/main" xmlns:c="http://schemas.openxmlformats.org/drawingml/2006/chart" xmlns:dgm="http://schemas.openxmlformats.org/drawingml/2006/diagram" xmlns:o="urn:schemas-microsoft-com:office:office" xmlns:v="urn:schemas-microsoft-com:vml" xmlns:pvml="urn:schemas-microsoft-com:office:powerpoint" xmlns:com="http://schemas.openxmlformats.org/drawingml/2006/compatibility" xmlns:p14="http://schemas.microsoft.com/office/powerpoint/2010/main" xmlns:p15="http://schemas.microsoft.com/office/powerpoint/2012/main" xmlns:ahyp="http://schemas.microsoft.com/office/drawing/2018/hyperlinkcolor">
-  <p:cSld>
-    <p:spTree>
-      <p:nvGrpSpPr>
-        <p:cNvPr id="191" name="Shape 191"/>
-        <p:cNvGrpSpPr/>
-        <p:nvPr/>
-      </p:nvGrpSpPr>
-      <p:grpSpPr>
-        <a:xfrm>
-          <a:off x="0" y="0"/>
-          <a:ext cx="0" cy="0"/>
-          <a:chOff x="0" y="0"/>
-          <a:chExt cx="0" cy="0"/>
-        </a:xfrm>
-      </p:grpSpPr>
-      <p:sp>
-        <p:nvSpPr>
-          <p:cNvPr id="192" name="Google Shape;192;p23"/>
-          <p:cNvSpPr txBox="1"/>
-          <p:nvPr>
-            <p:ph type="title"/>
-          </p:nvPr>
-        </p:nvSpPr>
-        <p:spPr>
-          <a:xfrm>
-            <a:off x="311700" y="410000"/>
-            <a:ext cx="8520600" cy="607800"/>
-          </a:xfrm>
-          <a:prstGeom prst="rect">
-            <a:avLst/>
-          </a:prstGeom>
-        </p:spPr>
-        <p:txBody>
-          <a:bodyPr anchorCtr="0" anchor="t" bIns="91425" lIns="91425" spcFirstLastPara="1" rIns="91425" wrap="square" tIns="91425">
-            <a:normAutofit fontScale="90000"/>
-          </a:bodyPr>
-          <a:lstStyle/>
-          <a:p>
-            <a:pPr indent="0" lvl="0" marL="0" rtl="0" algn="l">
-              <a:spcBef>
-                <a:spcPts val="0"/>
-              </a:spcBef>
-              <a:spcAft>
-                <a:spcPts val="0"/>
-              </a:spcAft>
-              <a:buNone/>
-            </a:pPr>
-            <a:r>
-              <a:rPr lang="zh-TW"/>
-              <a:t>ResNet50</a:t>
-            </a:r>
-            <a:endParaRPr/>
-          </a:p>
-        </p:txBody>
-      </p:sp>
-      <p:sp>
-        <p:nvSpPr>
-          <p:cNvPr id="193" name="Google Shape;193;p23"/>
-          <p:cNvSpPr txBox="1"/>
-          <p:nvPr/>
-        </p:nvSpPr>
-        <p:spPr>
-          <a:xfrm>
-            <a:off x="1391675" y="3130475"/>
-            <a:ext cx="6653400" cy="954300"/>
-          </a:xfrm>
-          <a:prstGeom prst="rect">
-            <a:avLst/>
-          </a:prstGeom>
-          <a:noFill/>
-          <a:ln>
-            <a:noFill/>
-          </a:ln>
-        </p:spPr>
-        <p:txBody>
-          <a:bodyPr anchorCtr="0" anchor="t" bIns="91425" lIns="91425" spcFirstLastPara="1" rIns="91425" wrap="square" tIns="91425">
-            <a:spAutoFit/>
-          </a:bodyPr>
-          <a:lstStyle/>
-          <a:p>
-            <a:pPr indent="0" lvl="0" marL="0" rtl="0" algn="l">
-              <a:spcBef>
-                <a:spcPts val="0"/>
-              </a:spcBef>
-              <a:spcAft>
-                <a:spcPts val="0"/>
-              </a:spcAft>
-              <a:buNone/>
-            </a:pPr>
-            <a:r>
-              <a:rPr lang="zh-TW" sz="1000">
-                <a:solidFill>
-                  <a:schemeClr val="dk2"/>
-                </a:solidFill>
-                <a:latin typeface="Roboto"/>
-                <a:ea typeface="Roboto"/>
-                <a:cs typeface="Roboto"/>
-                <a:sym typeface="Roboto"/>
-              </a:rPr>
-              <a:t>The Residual networks (ResNet in short) architecture is one of the most well known and popular networks in the literature, introduced by Microsoft Reseach in 2015 in the paper written by He. et. al. The residual networks proposed in this paper won the first places on ILSVRC 2015 classification task, ImageNet detection, ImageNet localization, COCO detection and COCO segmentation task.</a:t>
-            </a:r>
-            <a:endParaRPr sz="1000">
-              <a:solidFill>
-                <a:schemeClr val="dk2"/>
-              </a:solidFill>
-              <a:latin typeface="Roboto"/>
-              <a:ea typeface="Roboto"/>
-              <a:cs typeface="Roboto"/>
-              <a:sym typeface="Roboto"/>
-            </a:endParaRPr>
-          </a:p>
-          <a:p>
-            <a:pPr indent="0" lvl="0" marL="0" rtl="0" algn="l">
-              <a:spcBef>
-                <a:spcPts val="0"/>
-              </a:spcBef>
-              <a:spcAft>
-                <a:spcPts val="0"/>
-              </a:spcAft>
-              <a:buNone/>
-            </a:pPr>
-            <a:r>
-              <a:t/>
-            </a:r>
-            <a:endParaRPr sz="1000">
-              <a:solidFill>
-                <a:schemeClr val="dk2"/>
-              </a:solidFill>
-              <a:latin typeface="Roboto"/>
-              <a:ea typeface="Roboto"/>
-              <a:cs typeface="Roboto"/>
-              <a:sym typeface="Roboto"/>
-            </a:endParaRPr>
-          </a:p>
-        </p:txBody>
-      </p:sp>
-      <p:pic>
-        <p:nvPicPr>
-          <p:cNvPr id="194" name="Google Shape;194;p23"/>
-          <p:cNvPicPr preferRelativeResize="0"/>
-          <p:nvPr/>
-        </p:nvPicPr>
-        <p:blipFill>
-          <a:blip r:embed="rId3">
-            <a:alphaModFix/>
-          </a:blip>
-          <a:stretch>
-            <a:fillRect/>
-          </a:stretch>
-        </p:blipFill>
-        <p:spPr>
-          <a:xfrm>
-            <a:off x="1098913" y="1131250"/>
-            <a:ext cx="6946166" cy="1885775"/>
-          </a:xfrm>
-          <a:prstGeom prst="rect">
-            <a:avLst/>
-          </a:prstGeom>
-          <a:noFill/>
-          <a:ln>
-            <a:noFill/>
-          </a:ln>
-        </p:spPr>
-      </p:pic>
-    </p:spTree>
-  </p:cSld>
-  <p:clrMapOvr>
-    <a:masterClrMapping/>
-  </p:clrMapOvr>
-</p:sld>
-</file>
-
 <file path=ppt/slides/slide12.xml><?xml version="1.0" encoding="utf-8"?>
 <p:sld xmlns:a="http://schemas.openxmlformats.org/drawingml/2006/main" xmlns:r="http://schemas.openxmlformats.org/officeDocument/2006/relationships" xmlns:mc="http://schemas.openxmlformats.org/markup-compatibility/2006" xmlns:mv="urn:schemas-microsoft-com:mac:vml" xmlns:p="http://schemas.openxmlformats.org/presentationml/2006/main" xmlns:c="http://schemas.openxmlformats.org/drawingml/2006/chart" xmlns:dgm="http://schemas.openxmlformats.org/drawingml/2006/diagram" xmlns:o="urn:schemas-microsoft-com:office:office" xmlns:v="urn:schemas-microsoft-com:vml" xmlns:pvml="urn:schemas-microsoft-com:office:powerpoint" xmlns:com="http://schemas.openxmlformats.org/drawingml/2006/compatibility" xmlns:p14="http://schemas.microsoft.com/office/powerpoint/2010/main" xmlns:p15="http://schemas.microsoft.com/office/powerpoint/2012/main" xmlns:ahyp="http://schemas.microsoft.com/office/drawing/2018/hyperlinkcolor">
   <p:cSld>
@@ -16544,8 +16667,8 @@
         </p:nvSpPr>
         <p:spPr>
           <a:xfrm>
-            <a:off x="600625" y="1172875"/>
-            <a:ext cx="3322500" cy="3109200"/>
+            <a:off x="1391675" y="3130475"/>
+            <a:ext cx="6653400" cy="954300"/>
           </a:xfrm>
           <a:prstGeom prst="rect">
             <a:avLst/>
@@ -16580,7 +16703,7 @@
                 <a:cs typeface="Roboto"/>
                 <a:sym typeface="Roboto"/>
               </a:rPr>
-              <a:t>The identity block is a residual block that preserves the input information by bypassing the identity of the input directly to the output. It consists of three main layers: two convolutional layers with smaller filter sizes and a batch normalization layer. These layers operate in a sequence without any skip connections. The skip connection helps mitigate the vanishing gradient problem, facilitating the flow of gradients during backpropagation.</a:t>
+              <a:t>The Residual networks (ResNet in short) architecture is one of the most well known and popular networks in the literature, introduced by Microsoft Reseach in 2015 in the paper written by He. et. al. The residual networks proposed in this paper won the first places on ILSVRC 2015 classification task, ImageNet detection, ImageNet localization, COCO detection and COCO segmentation task.</a:t>
             </a:r>
             <a:endParaRPr sz="1000">
               <a:solidFill>
@@ -16604,70 +16727,6 @@
             </a:pPr>
             <a:r>
               <a:t/>
-            </a:r>
-            <a:endParaRPr sz="1000">
-              <a:solidFill>
-                <a:schemeClr val="dk2"/>
-              </a:solidFill>
-              <a:latin typeface="Roboto"/>
-              <a:ea typeface="Roboto"/>
-              <a:cs typeface="Roboto"/>
-              <a:sym typeface="Roboto"/>
-            </a:endParaRPr>
-          </a:p>
-          <a:p>
-            <a:pPr indent="0" lvl="0" marL="0" rtl="0" algn="l">
-              <a:spcBef>
-                <a:spcPts val="0"/>
-              </a:spcBef>
-              <a:spcAft>
-                <a:spcPts val="0"/>
-              </a:spcAft>
-              <a:buNone/>
-            </a:pPr>
-            <a:r>
-              <a:rPr lang="zh-TW" sz="1000">
-                <a:solidFill>
-                  <a:schemeClr val="dk2"/>
-                </a:solidFill>
-                <a:latin typeface="Roboto"/>
-                <a:ea typeface="Roboto"/>
-                <a:cs typeface="Roboto"/>
-                <a:sym typeface="Roboto"/>
-              </a:rPr>
-              <a:t>The convolutional block, also known as a residual block with a convolutional shortcut, includes a convolutional layer in the shortcut connection. It involves three layers: a convolutional layer with a larger filter size, a batch normalization layer, and a rectified linear unit (ReLU) activation function. The convolutional shortcut provides an alternative route for gradient flow, enhancing the ability of the network to learn complex features.</a:t>
-            </a:r>
-            <a:endParaRPr sz="1000">
-              <a:solidFill>
-                <a:schemeClr val="dk2"/>
-              </a:solidFill>
-              <a:latin typeface="Roboto"/>
-              <a:ea typeface="Roboto"/>
-              <a:cs typeface="Roboto"/>
-              <a:sym typeface="Roboto"/>
-            </a:endParaRPr>
-          </a:p>
-          <a:p>
-            <a:pPr indent="0" lvl="0" marL="0" rtl="0" algn="l">
-              <a:spcBef>
-                <a:spcPts val="0"/>
-              </a:spcBef>
-              <a:spcAft>
-                <a:spcPts val="0"/>
-              </a:spcAft>
-              <a:buNone/>
-            </a:pPr>
-            <a:r>
-              <a:rPr lang="zh-TW" sz="1000">
-                <a:solidFill>
-                  <a:schemeClr val="dk2"/>
-                </a:solidFill>
-                <a:latin typeface="Roboto"/>
-                <a:ea typeface="Roboto"/>
-                <a:cs typeface="Roboto"/>
-                <a:sym typeface="Roboto"/>
-              </a:rPr>
-              <a:t> </a:t>
             </a:r>
             <a:endParaRPr sz="1000">
               <a:solidFill>
@@ -16697,6 +16756,244 @@
         </p:blipFill>
         <p:spPr>
           <a:xfrm>
+            <a:off x="1098913" y="1131250"/>
+            <a:ext cx="6946166" cy="1885775"/>
+          </a:xfrm>
+          <a:prstGeom prst="rect">
+            <a:avLst/>
+          </a:prstGeom>
+          <a:noFill/>
+          <a:ln>
+            <a:noFill/>
+          </a:ln>
+        </p:spPr>
+      </p:pic>
+    </p:spTree>
+  </p:cSld>
+  <p:clrMapOvr>
+    <a:masterClrMapping/>
+  </p:clrMapOvr>
+</p:sld>
+</file>
+
+<file path=ppt/slides/slide13.xml><?xml version="1.0" encoding="utf-8"?>
+<p:sld xmlns:a="http://schemas.openxmlformats.org/drawingml/2006/main" xmlns:r="http://schemas.openxmlformats.org/officeDocument/2006/relationships" xmlns:mc="http://schemas.openxmlformats.org/markup-compatibility/2006" xmlns:mv="urn:schemas-microsoft-com:mac:vml" xmlns:p="http://schemas.openxmlformats.org/presentationml/2006/main" xmlns:c="http://schemas.openxmlformats.org/drawingml/2006/chart" xmlns:dgm="http://schemas.openxmlformats.org/drawingml/2006/diagram" xmlns:o="urn:schemas-microsoft-com:office:office" xmlns:v="urn:schemas-microsoft-com:vml" xmlns:pvml="urn:schemas-microsoft-com:office:powerpoint" xmlns:com="http://schemas.openxmlformats.org/drawingml/2006/compatibility" xmlns:p14="http://schemas.microsoft.com/office/powerpoint/2010/main" xmlns:p15="http://schemas.microsoft.com/office/powerpoint/2012/main" xmlns:ahyp="http://schemas.microsoft.com/office/drawing/2018/hyperlinkcolor">
+  <p:cSld>
+    <p:spTree>
+      <p:nvGrpSpPr>
+        <p:cNvPr id="205" name="Shape 205"/>
+        <p:cNvGrpSpPr/>
+        <p:nvPr/>
+      </p:nvGrpSpPr>
+      <p:grpSpPr>
+        <a:xfrm>
+          <a:off x="0" y="0"/>
+          <a:ext cx="0" cy="0"/>
+          <a:chOff x="0" y="0"/>
+          <a:chExt cx="0" cy="0"/>
+        </a:xfrm>
+      </p:grpSpPr>
+      <p:sp>
+        <p:nvSpPr>
+          <p:cNvPr id="206" name="Google Shape;206;p25"/>
+          <p:cNvSpPr txBox="1"/>
+          <p:nvPr>
+            <p:ph type="title"/>
+          </p:nvPr>
+        </p:nvSpPr>
+        <p:spPr>
+          <a:xfrm>
+            <a:off x="311700" y="410000"/>
+            <a:ext cx="8520600" cy="607800"/>
+          </a:xfrm>
+          <a:prstGeom prst="rect">
+            <a:avLst/>
+          </a:prstGeom>
+        </p:spPr>
+        <p:txBody>
+          <a:bodyPr anchorCtr="0" anchor="t" bIns="91425" lIns="91425" spcFirstLastPara="1" rIns="91425" wrap="square" tIns="91425">
+            <a:normAutofit fontScale="90000"/>
+          </a:bodyPr>
+          <a:lstStyle/>
+          <a:p>
+            <a:pPr indent="0" lvl="0" marL="0" rtl="0" algn="l">
+              <a:spcBef>
+                <a:spcPts val="0"/>
+              </a:spcBef>
+              <a:spcAft>
+                <a:spcPts val="0"/>
+              </a:spcAft>
+              <a:buNone/>
+            </a:pPr>
+            <a:r>
+              <a:rPr lang="zh-TW"/>
+              <a:t>ResNet50</a:t>
+            </a:r>
+            <a:endParaRPr/>
+          </a:p>
+        </p:txBody>
+      </p:sp>
+      <p:sp>
+        <p:nvSpPr>
+          <p:cNvPr id="207" name="Google Shape;207;p25"/>
+          <p:cNvSpPr txBox="1"/>
+          <p:nvPr/>
+        </p:nvSpPr>
+        <p:spPr>
+          <a:xfrm>
+            <a:off x="600625" y="1172875"/>
+            <a:ext cx="3322500" cy="3109200"/>
+          </a:xfrm>
+          <a:prstGeom prst="rect">
+            <a:avLst/>
+          </a:prstGeom>
+          <a:noFill/>
+          <a:ln>
+            <a:noFill/>
+          </a:ln>
+        </p:spPr>
+        <p:txBody>
+          <a:bodyPr anchorCtr="0" anchor="t" bIns="91425" lIns="91425" spcFirstLastPara="1" rIns="91425" wrap="square" tIns="91425">
+            <a:spAutoFit/>
+          </a:bodyPr>
+          <a:lstStyle/>
+          <a:p>
+            <a:pPr indent="0" lvl="0" marL="0" rtl="0" algn="l">
+              <a:spcBef>
+                <a:spcPts val="0"/>
+              </a:spcBef>
+              <a:spcAft>
+                <a:spcPts val="0"/>
+              </a:spcAft>
+              <a:buNone/>
+            </a:pPr>
+            <a:r>
+              <a:rPr lang="zh-TW" sz="1000">
+                <a:solidFill>
+                  <a:schemeClr val="dk2"/>
+                </a:solidFill>
+                <a:latin typeface="Roboto"/>
+                <a:ea typeface="Roboto"/>
+                <a:cs typeface="Roboto"/>
+                <a:sym typeface="Roboto"/>
+              </a:rPr>
+              <a:t>The identity block is a residual block that preserves the input information by bypassing the identity of the input directly to the output. It consists of three main layers: two convolutional layers with smaller filter sizes and a batch normalization layer. These layers operate in a sequence without any skip connections. The skip connection helps mitigate the vanishing gradient problem, facilitating the flow of gradients during backpropagation.</a:t>
+            </a:r>
+            <a:endParaRPr sz="1000">
+              <a:solidFill>
+                <a:schemeClr val="dk2"/>
+              </a:solidFill>
+              <a:latin typeface="Roboto"/>
+              <a:ea typeface="Roboto"/>
+              <a:cs typeface="Roboto"/>
+              <a:sym typeface="Roboto"/>
+            </a:endParaRPr>
+          </a:p>
+          <a:p>
+            <a:pPr indent="0" lvl="0" marL="0" rtl="0" algn="l">
+              <a:spcBef>
+                <a:spcPts val="0"/>
+              </a:spcBef>
+              <a:spcAft>
+                <a:spcPts val="0"/>
+              </a:spcAft>
+              <a:buNone/>
+            </a:pPr>
+            <a:r>
+              <a:t/>
+            </a:r>
+            <a:endParaRPr sz="1000">
+              <a:solidFill>
+                <a:schemeClr val="dk2"/>
+              </a:solidFill>
+              <a:latin typeface="Roboto"/>
+              <a:ea typeface="Roboto"/>
+              <a:cs typeface="Roboto"/>
+              <a:sym typeface="Roboto"/>
+            </a:endParaRPr>
+          </a:p>
+          <a:p>
+            <a:pPr indent="0" lvl="0" marL="0" rtl="0" algn="l">
+              <a:spcBef>
+                <a:spcPts val="0"/>
+              </a:spcBef>
+              <a:spcAft>
+                <a:spcPts val="0"/>
+              </a:spcAft>
+              <a:buNone/>
+            </a:pPr>
+            <a:r>
+              <a:rPr lang="zh-TW" sz="1000">
+                <a:solidFill>
+                  <a:schemeClr val="dk2"/>
+                </a:solidFill>
+                <a:latin typeface="Roboto"/>
+                <a:ea typeface="Roboto"/>
+                <a:cs typeface="Roboto"/>
+                <a:sym typeface="Roboto"/>
+              </a:rPr>
+              <a:t>The convolutional block, also known as a residual block with a convolutional shortcut, includes a convolutional layer in the shortcut connection. It involves three layers: a convolutional layer with a larger filter size, a batch normalization layer, and a rectified linear unit (ReLU) activation function. The convolutional shortcut provides an alternative route for gradient flow, enhancing the ability of the network to learn complex features.</a:t>
+            </a:r>
+            <a:endParaRPr sz="1000">
+              <a:solidFill>
+                <a:schemeClr val="dk2"/>
+              </a:solidFill>
+              <a:latin typeface="Roboto"/>
+              <a:ea typeface="Roboto"/>
+              <a:cs typeface="Roboto"/>
+              <a:sym typeface="Roboto"/>
+            </a:endParaRPr>
+          </a:p>
+          <a:p>
+            <a:pPr indent="0" lvl="0" marL="0" rtl="0" algn="l">
+              <a:spcBef>
+                <a:spcPts val="0"/>
+              </a:spcBef>
+              <a:spcAft>
+                <a:spcPts val="0"/>
+              </a:spcAft>
+              <a:buNone/>
+            </a:pPr>
+            <a:r>
+              <a:rPr lang="zh-TW" sz="1000">
+                <a:solidFill>
+                  <a:schemeClr val="dk2"/>
+                </a:solidFill>
+                <a:latin typeface="Roboto"/>
+                <a:ea typeface="Roboto"/>
+                <a:cs typeface="Roboto"/>
+                <a:sym typeface="Roboto"/>
+              </a:rPr>
+              <a:t> </a:t>
+            </a:r>
+            <a:endParaRPr sz="1000">
+              <a:solidFill>
+                <a:schemeClr val="dk2"/>
+              </a:solidFill>
+              <a:latin typeface="Roboto"/>
+              <a:ea typeface="Roboto"/>
+              <a:cs typeface="Roboto"/>
+              <a:sym typeface="Roboto"/>
+            </a:endParaRPr>
+          </a:p>
+        </p:txBody>
+      </p:sp>
+      <p:pic>
+        <p:nvPicPr>
+          <p:cNvPr id="208" name="Google Shape;208;p25"/>
+          <p:cNvPicPr preferRelativeResize="0"/>
+          <p:nvPr/>
+        </p:nvPicPr>
+        <p:blipFill>
+          <a:blip r:embed="rId3">
+            <a:alphaModFix/>
+          </a:blip>
+          <a:stretch>
+            <a:fillRect/>
+          </a:stretch>
+        </p:blipFill>
+        <p:spPr>
+          <a:xfrm>
             <a:off x="4232400" y="1172875"/>
             <a:ext cx="4424026" cy="2018625"/>
           </a:xfrm>
@@ -16711,7 +17008,7 @@
       </p:pic>
       <p:sp>
         <p:nvSpPr>
-          <p:cNvPr id="202" name="Google Shape;202;p24"/>
+          <p:cNvPr id="209" name="Google Shape;209;p25"/>
           <p:cNvSpPr/>
           <p:nvPr/>
         </p:nvSpPr>
@@ -16765,7 +17062,7 @@
       </p:sp>
       <p:sp>
         <p:nvSpPr>
-          <p:cNvPr id="203" name="Google Shape;203;p24"/>
+          <p:cNvPr id="210" name="Google Shape;210;p25"/>
           <p:cNvSpPr/>
           <p:nvPr/>
         </p:nvSpPr>
@@ -16819,7 +17116,7 @@
       </p:sp>
       <p:sp>
         <p:nvSpPr>
-          <p:cNvPr id="204" name="Google Shape;204;p24"/>
+          <p:cNvPr id="211" name="Google Shape;211;p25"/>
           <p:cNvSpPr txBox="1"/>
           <p:nvPr/>
         </p:nvSpPr>
@@ -16877,7 +17174,7 @@
       </p:sp>
       <p:sp>
         <p:nvSpPr>
-          <p:cNvPr id="205" name="Google Shape;205;p24"/>
+          <p:cNvPr id="212" name="Google Shape;212;p25"/>
           <p:cNvSpPr txBox="1"/>
           <p:nvPr/>
         </p:nvSpPr>
@@ -16933,235 +17230,6 @@
           </a:p>
         </p:txBody>
       </p:sp>
-    </p:spTree>
-  </p:cSld>
-  <p:clrMapOvr>
-    <a:masterClrMapping/>
-  </p:clrMapOvr>
-</p:sld>
-</file>
-
-<file path=ppt/slides/slide13.xml><?xml version="1.0" encoding="utf-8"?>
-<p:sld xmlns:a="http://schemas.openxmlformats.org/drawingml/2006/main" xmlns:r="http://schemas.openxmlformats.org/officeDocument/2006/relationships" xmlns:mc="http://schemas.openxmlformats.org/markup-compatibility/2006" xmlns:mv="urn:schemas-microsoft-com:mac:vml" xmlns:p="http://schemas.openxmlformats.org/presentationml/2006/main" xmlns:c="http://schemas.openxmlformats.org/drawingml/2006/chart" xmlns:dgm="http://schemas.openxmlformats.org/drawingml/2006/diagram" xmlns:o="urn:schemas-microsoft-com:office:office" xmlns:v="urn:schemas-microsoft-com:vml" xmlns:pvml="urn:schemas-microsoft-com:office:powerpoint" xmlns:com="http://schemas.openxmlformats.org/drawingml/2006/compatibility" xmlns:p14="http://schemas.microsoft.com/office/powerpoint/2010/main" xmlns:p15="http://schemas.microsoft.com/office/powerpoint/2012/main" xmlns:ahyp="http://schemas.microsoft.com/office/drawing/2018/hyperlinkcolor">
-  <p:cSld>
-    <p:spTree>
-      <p:nvGrpSpPr>
-        <p:cNvPr id="209" name="Shape 209"/>
-        <p:cNvGrpSpPr/>
-        <p:nvPr/>
-      </p:nvGrpSpPr>
-      <p:grpSpPr>
-        <a:xfrm>
-          <a:off x="0" y="0"/>
-          <a:ext cx="0" cy="0"/>
-          <a:chOff x="0" y="0"/>
-          <a:chExt cx="0" cy="0"/>
-        </a:xfrm>
-      </p:grpSpPr>
-      <p:sp>
-        <p:nvSpPr>
-          <p:cNvPr id="210" name="Google Shape;210;p25"/>
-          <p:cNvSpPr txBox="1"/>
-          <p:nvPr>
-            <p:ph type="title"/>
-          </p:nvPr>
-        </p:nvSpPr>
-        <p:spPr>
-          <a:xfrm>
-            <a:off x="311700" y="410000"/>
-            <a:ext cx="8520600" cy="607800"/>
-          </a:xfrm>
-          <a:prstGeom prst="rect">
-            <a:avLst/>
-          </a:prstGeom>
-        </p:spPr>
-        <p:txBody>
-          <a:bodyPr anchorCtr="0" anchor="t" bIns="91425" lIns="91425" spcFirstLastPara="1" rIns="91425" wrap="square" tIns="91425">
-            <a:normAutofit fontScale="90000"/>
-          </a:bodyPr>
-          <a:lstStyle/>
-          <a:p>
-            <a:pPr indent="0" lvl="0" marL="0" rtl="0" algn="l">
-              <a:spcBef>
-                <a:spcPts val="0"/>
-              </a:spcBef>
-              <a:spcAft>
-                <a:spcPts val="0"/>
-              </a:spcAft>
-              <a:buNone/>
-            </a:pPr>
-            <a:r>
-              <a:rPr lang="zh-TW"/>
-              <a:t>ResNet50</a:t>
-            </a:r>
-            <a:endParaRPr/>
-          </a:p>
-        </p:txBody>
-      </p:sp>
-      <p:sp>
-        <p:nvSpPr>
-          <p:cNvPr id="211" name="Google Shape;211;p25"/>
-          <p:cNvSpPr txBox="1"/>
-          <p:nvPr/>
-        </p:nvSpPr>
-        <p:spPr>
-          <a:xfrm>
-            <a:off x="1090700" y="1229125"/>
-            <a:ext cx="3149100" cy="3263100"/>
-          </a:xfrm>
-          <a:prstGeom prst="rect">
-            <a:avLst/>
-          </a:prstGeom>
-          <a:noFill/>
-          <a:ln>
-            <a:noFill/>
-          </a:ln>
-        </p:spPr>
-        <p:txBody>
-          <a:bodyPr anchorCtr="0" anchor="t" bIns="91425" lIns="91425" spcFirstLastPara="1" rIns="91425" wrap="square" tIns="91425">
-            <a:spAutoFit/>
-          </a:bodyPr>
-          <a:lstStyle/>
-          <a:p>
-            <a:pPr indent="0" lvl="0" marL="0" rtl="0" algn="l">
-              <a:spcBef>
-                <a:spcPts val="0"/>
-              </a:spcBef>
-              <a:spcAft>
-                <a:spcPts val="0"/>
-              </a:spcAft>
-              <a:buNone/>
-            </a:pPr>
-            <a:r>
-              <a:rPr lang="zh-TW" sz="1000">
-                <a:solidFill>
-                  <a:schemeClr val="dk2"/>
-                </a:solidFill>
-                <a:latin typeface="Roboto"/>
-                <a:ea typeface="Roboto"/>
-                <a:cs typeface="Roboto"/>
-                <a:sym typeface="Roboto"/>
-              </a:rPr>
-              <a:t>We categorize photos into two classes: urban and rural, denoted as num_classes. Moving on to building the model, we configure a sequential model to which we can add layers. Initially, we incorporate a pre-trained ResNet model. By setting include_top=False during the ResNet model creation, we indicate the exclusion of its last prediction-making layer. Additionally, we use a file without the weights for that layer.</a:t>
-            </a:r>
-            <a:endParaRPr sz="1000">
-              <a:solidFill>
-                <a:schemeClr val="dk2"/>
-              </a:solidFill>
-              <a:latin typeface="Roboto"/>
-              <a:ea typeface="Roboto"/>
-              <a:cs typeface="Roboto"/>
-              <a:sym typeface="Roboto"/>
-            </a:endParaRPr>
-          </a:p>
-          <a:p>
-            <a:pPr indent="0" lvl="0" marL="0" rtl="0" algn="l">
-              <a:spcBef>
-                <a:spcPts val="0"/>
-              </a:spcBef>
-              <a:spcAft>
-                <a:spcPts val="0"/>
-              </a:spcAft>
-              <a:buNone/>
-            </a:pPr>
-            <a:r>
-              <a:t/>
-            </a:r>
-            <a:endParaRPr sz="1000">
-              <a:solidFill>
-                <a:schemeClr val="dk2"/>
-              </a:solidFill>
-              <a:latin typeface="Roboto"/>
-              <a:ea typeface="Roboto"/>
-              <a:cs typeface="Roboto"/>
-              <a:sym typeface="Roboto"/>
-            </a:endParaRPr>
-          </a:p>
-          <a:p>
-            <a:pPr indent="0" lvl="0" marL="0" rtl="0" algn="l">
-              <a:spcBef>
-                <a:spcPts val="0"/>
-              </a:spcBef>
-              <a:spcAft>
-                <a:spcPts val="0"/>
-              </a:spcAft>
-              <a:buNone/>
-            </a:pPr>
-            <a:r>
-              <a:rPr lang="zh-TW" sz="1000">
-                <a:solidFill>
-                  <a:schemeClr val="dk2"/>
-                </a:solidFill>
-                <a:latin typeface="Roboto"/>
-                <a:ea typeface="Roboto"/>
-                <a:cs typeface="Roboto"/>
-                <a:sym typeface="Roboto"/>
-              </a:rPr>
-              <a:t>The argument pooling='avg' specifies that, if there are extra channels in the tensor at the end of this step, we want to condense them into a 1D tensor by taking an average. This results in a pre-trained model that generates the layer depicted in the graphic. Subsequently, we add a Dense layer for predictions, specifying the number of nodes in alignment with the number of classes. Finally, we apply the softmax function to generate probabilities.</a:t>
-            </a:r>
-            <a:endParaRPr sz="1000">
-              <a:solidFill>
-                <a:schemeClr val="dk2"/>
-              </a:solidFill>
-              <a:latin typeface="Roboto"/>
-              <a:ea typeface="Roboto"/>
-              <a:cs typeface="Roboto"/>
-              <a:sym typeface="Roboto"/>
-            </a:endParaRPr>
-          </a:p>
-          <a:p>
-            <a:pPr indent="0" lvl="0" marL="0" rtl="0" algn="l">
-              <a:spcBef>
-                <a:spcPts val="0"/>
-              </a:spcBef>
-              <a:spcAft>
-                <a:spcPts val="0"/>
-              </a:spcAft>
-              <a:buNone/>
-            </a:pPr>
-            <a:r>
-              <a:t/>
-            </a:r>
-            <a:endParaRPr sz="1000">
-              <a:solidFill>
-                <a:schemeClr val="dk2"/>
-              </a:solidFill>
-              <a:latin typeface="Roboto"/>
-              <a:ea typeface="Roboto"/>
-              <a:cs typeface="Roboto"/>
-              <a:sym typeface="Roboto"/>
-            </a:endParaRPr>
-          </a:p>
-        </p:txBody>
-      </p:sp>
-      <p:pic>
-        <p:nvPicPr>
-          <p:cNvPr id="212" name="Google Shape;212;p25"/>
-          <p:cNvPicPr preferRelativeResize="0"/>
-          <p:nvPr/>
-        </p:nvPicPr>
-        <p:blipFill>
-          <a:blip r:embed="rId3">
-            <a:alphaModFix/>
-          </a:blip>
-          <a:stretch>
-            <a:fillRect/>
-          </a:stretch>
-        </p:blipFill>
-        <p:spPr>
-          <a:xfrm>
-            <a:off x="4386125" y="1624475"/>
-            <a:ext cx="4386174" cy="1156725"/>
-          </a:xfrm>
-          <a:prstGeom prst="rect">
-            <a:avLst/>
-          </a:prstGeom>
-          <a:noFill/>
-          <a:ln>
-            <a:noFill/>
-          </a:ln>
-        </p:spPr>
-      </p:pic>
     </p:spTree>
   </p:cSld>
   <p:clrMapOvr>
@@ -17227,44 +17295,16 @@
           </a:p>
         </p:txBody>
       </p:sp>
-      <p:pic>
-        <p:nvPicPr>
-          <p:cNvPr id="218" name="Google Shape;218;p26"/>
-          <p:cNvPicPr preferRelativeResize="0"/>
-          <p:nvPr/>
-        </p:nvPicPr>
-        <p:blipFill>
-          <a:blip r:embed="rId3">
-            <a:alphaModFix/>
-          </a:blip>
-          <a:stretch>
-            <a:fillRect/>
-          </a:stretch>
-        </p:blipFill>
-        <p:spPr>
-          <a:xfrm>
-            <a:off x="4381150" y="1476875"/>
-            <a:ext cx="4118599" cy="2119925"/>
-          </a:xfrm>
-          <a:prstGeom prst="rect">
-            <a:avLst/>
-          </a:prstGeom>
-          <a:noFill/>
-          <a:ln>
-            <a:noFill/>
-          </a:ln>
-        </p:spPr>
-      </p:pic>
       <p:sp>
         <p:nvSpPr>
-          <p:cNvPr id="219" name="Google Shape;219;p26"/>
+          <p:cNvPr id="218" name="Google Shape;218;p26"/>
           <p:cNvSpPr txBox="1"/>
           <p:nvPr/>
         </p:nvSpPr>
         <p:spPr>
           <a:xfrm>
-            <a:off x="925725" y="1401900"/>
-            <a:ext cx="3149100" cy="2339700"/>
+            <a:off x="1090700" y="1229125"/>
+            <a:ext cx="3149100" cy="3263100"/>
           </a:xfrm>
           <a:prstGeom prst="rect">
             <a:avLst/>
@@ -17299,7 +17339,7 @@
                 <a:cs typeface="Roboto"/>
                 <a:sym typeface="Roboto"/>
               </a:rPr>
-              <a:t>The parameters from ResNet are frozen, allowing only the last layer to be trainable. Therefore, the total number of trainable parameters is equal to twice the number of nodes in the last layer (2 * 2048), resulting in 4096 parameters.</a:t>
+              <a:t>We categorize photos into two classes: urban and rural, denoted as num_classes. Moving on to building the model, we configure a sequential model to which we can add layers. Initially, we incorporate a pre-trained ResNet model. By setting include_top=False during the ResNet model creation, we indicate the exclusion of its last prediction-making layer. Additionally, we use a file without the weights for that layer.</a:t>
             </a:r>
             <a:endParaRPr sz="1000">
               <a:solidFill>
@@ -17354,7 +17394,30 @@
                 <a:cs typeface="Roboto"/>
                 <a:sym typeface="Roboto"/>
               </a:rPr>
-              <a:t>We employ stochastic gradient descent (SGD) to minimize the categorical cross-entropy loss. Additionally, we instruct the code to provide the accuracy metric, representing the fraction of correct predictions. This metric is more straightforward to interpret compared to categorical cross-entropy scores, making it beneficial to print and assess the model's performance.</a:t>
+              <a:t>The argument pooling='avg' specifies that, if there are extra channels in the tensor at the end of this step, we want to condense them into a 1D tensor by taking an average. This results in a pre-trained model that generates the layer depicted in the graphic. Subsequently, we add a Dense layer for predictions, specifying the number of nodes in alignment with the number of classes. Finally, we apply the softmax function to generate probabilities.</a:t>
+            </a:r>
+            <a:endParaRPr sz="1000">
+              <a:solidFill>
+                <a:schemeClr val="dk2"/>
+              </a:solidFill>
+              <a:latin typeface="Roboto"/>
+              <a:ea typeface="Roboto"/>
+              <a:cs typeface="Roboto"/>
+              <a:sym typeface="Roboto"/>
+            </a:endParaRPr>
+          </a:p>
+          <a:p>
+            <a:pPr indent="0" lvl="0" marL="0" rtl="0" algn="l">
+              <a:spcBef>
+                <a:spcPts val="0"/>
+              </a:spcBef>
+              <a:spcAft>
+                <a:spcPts val="0"/>
+              </a:spcAft>
+              <a:buNone/>
+            </a:pPr>
+            <a:r>
+              <a:t/>
             </a:r>
             <a:endParaRPr sz="1000">
               <a:solidFill>
@@ -17368,6 +17431,34 @@
           </a:p>
         </p:txBody>
       </p:sp>
+      <p:pic>
+        <p:nvPicPr>
+          <p:cNvPr id="219" name="Google Shape;219;p26"/>
+          <p:cNvPicPr preferRelativeResize="0"/>
+          <p:nvPr/>
+        </p:nvPicPr>
+        <p:blipFill>
+          <a:blip r:embed="rId3">
+            <a:alphaModFix/>
+          </a:blip>
+          <a:stretch>
+            <a:fillRect/>
+          </a:stretch>
+        </p:blipFill>
+        <p:spPr>
+          <a:xfrm>
+            <a:off x="4386125" y="1624475"/>
+            <a:ext cx="4386174" cy="1156725"/>
+          </a:xfrm>
+          <a:prstGeom prst="rect">
+            <a:avLst/>
+          </a:prstGeom>
+          <a:noFill/>
+          <a:ln>
+            <a:noFill/>
+          </a:ln>
+        </p:spPr>
+      </p:pic>
     </p:spTree>
   </p:cSld>
   <p:clrMapOvr>
@@ -17427,7 +17518,7 @@
             </a:pPr>
             <a:r>
               <a:rPr lang="zh-TW"/>
-              <a:t>ResNet50  Results</a:t>
+              <a:t>ResNet50</a:t>
             </a:r>
             <a:endParaRPr/>
           </a:p>
@@ -17436,6 +17527,212 @@
       <p:pic>
         <p:nvPicPr>
           <p:cNvPr id="225" name="Google Shape;225;p27"/>
+          <p:cNvPicPr preferRelativeResize="0"/>
+          <p:nvPr/>
+        </p:nvPicPr>
+        <p:blipFill>
+          <a:blip r:embed="rId3">
+            <a:alphaModFix/>
+          </a:blip>
+          <a:stretch>
+            <a:fillRect/>
+          </a:stretch>
+        </p:blipFill>
+        <p:spPr>
+          <a:xfrm>
+            <a:off x="4381150" y="1476875"/>
+            <a:ext cx="4118599" cy="2119925"/>
+          </a:xfrm>
+          <a:prstGeom prst="rect">
+            <a:avLst/>
+          </a:prstGeom>
+          <a:noFill/>
+          <a:ln>
+            <a:noFill/>
+          </a:ln>
+        </p:spPr>
+      </p:pic>
+      <p:sp>
+        <p:nvSpPr>
+          <p:cNvPr id="226" name="Google Shape;226;p27"/>
+          <p:cNvSpPr txBox="1"/>
+          <p:nvPr/>
+        </p:nvSpPr>
+        <p:spPr>
+          <a:xfrm>
+            <a:off x="925725" y="1401900"/>
+            <a:ext cx="3149100" cy="2339700"/>
+          </a:xfrm>
+          <a:prstGeom prst="rect">
+            <a:avLst/>
+          </a:prstGeom>
+          <a:noFill/>
+          <a:ln>
+            <a:noFill/>
+          </a:ln>
+        </p:spPr>
+        <p:txBody>
+          <a:bodyPr anchorCtr="0" anchor="t" bIns="91425" lIns="91425" spcFirstLastPara="1" rIns="91425" wrap="square" tIns="91425">
+            <a:spAutoFit/>
+          </a:bodyPr>
+          <a:lstStyle/>
+          <a:p>
+            <a:pPr indent="0" lvl="0" marL="0" rtl="0" algn="l">
+              <a:spcBef>
+                <a:spcPts val="0"/>
+              </a:spcBef>
+              <a:spcAft>
+                <a:spcPts val="0"/>
+              </a:spcAft>
+              <a:buNone/>
+            </a:pPr>
+            <a:r>
+              <a:rPr lang="zh-TW" sz="1000">
+                <a:solidFill>
+                  <a:schemeClr val="dk2"/>
+                </a:solidFill>
+                <a:latin typeface="Roboto"/>
+                <a:ea typeface="Roboto"/>
+                <a:cs typeface="Roboto"/>
+                <a:sym typeface="Roboto"/>
+              </a:rPr>
+              <a:t>The parameters from ResNet are frozen, allowing only the last layer to be trainable. Therefore, the total number of trainable parameters is equal to twice the number of nodes in the last layer (2 * 2048), resulting in 4096 parameters.</a:t>
+            </a:r>
+            <a:endParaRPr sz="1000">
+              <a:solidFill>
+                <a:schemeClr val="dk2"/>
+              </a:solidFill>
+              <a:latin typeface="Roboto"/>
+              <a:ea typeface="Roboto"/>
+              <a:cs typeface="Roboto"/>
+              <a:sym typeface="Roboto"/>
+            </a:endParaRPr>
+          </a:p>
+          <a:p>
+            <a:pPr indent="0" lvl="0" marL="0" rtl="0" algn="l">
+              <a:spcBef>
+                <a:spcPts val="0"/>
+              </a:spcBef>
+              <a:spcAft>
+                <a:spcPts val="0"/>
+              </a:spcAft>
+              <a:buNone/>
+            </a:pPr>
+            <a:r>
+              <a:t/>
+            </a:r>
+            <a:endParaRPr sz="1000">
+              <a:solidFill>
+                <a:schemeClr val="dk2"/>
+              </a:solidFill>
+              <a:latin typeface="Roboto"/>
+              <a:ea typeface="Roboto"/>
+              <a:cs typeface="Roboto"/>
+              <a:sym typeface="Roboto"/>
+            </a:endParaRPr>
+          </a:p>
+          <a:p>
+            <a:pPr indent="0" lvl="0" marL="0" rtl="0" algn="l">
+              <a:spcBef>
+                <a:spcPts val="0"/>
+              </a:spcBef>
+              <a:spcAft>
+                <a:spcPts val="0"/>
+              </a:spcAft>
+              <a:buNone/>
+            </a:pPr>
+            <a:r>
+              <a:rPr lang="zh-TW" sz="1000">
+                <a:solidFill>
+                  <a:schemeClr val="dk2"/>
+                </a:solidFill>
+                <a:latin typeface="Roboto"/>
+                <a:ea typeface="Roboto"/>
+                <a:cs typeface="Roboto"/>
+                <a:sym typeface="Roboto"/>
+              </a:rPr>
+              <a:t>We employ stochastic gradient descent (SGD) to minimize the categorical cross-entropy loss. Additionally, we instruct the code to provide the accuracy metric, representing the fraction of correct predictions. This metric is more straightforward to interpret compared to categorical cross-entropy scores, making it beneficial to print and assess the model's performance.</a:t>
+            </a:r>
+            <a:endParaRPr sz="1000">
+              <a:solidFill>
+                <a:schemeClr val="dk2"/>
+              </a:solidFill>
+              <a:latin typeface="Roboto"/>
+              <a:ea typeface="Roboto"/>
+              <a:cs typeface="Roboto"/>
+              <a:sym typeface="Roboto"/>
+            </a:endParaRPr>
+          </a:p>
+        </p:txBody>
+      </p:sp>
+    </p:spTree>
+  </p:cSld>
+  <p:clrMapOvr>
+    <a:masterClrMapping/>
+  </p:clrMapOvr>
+</p:sld>
+</file>
+
+<file path=ppt/slides/slide16.xml><?xml version="1.0" encoding="utf-8"?>
+<p:sld xmlns:a="http://schemas.openxmlformats.org/drawingml/2006/main" xmlns:r="http://schemas.openxmlformats.org/officeDocument/2006/relationships" xmlns:mc="http://schemas.openxmlformats.org/markup-compatibility/2006" xmlns:mv="urn:schemas-microsoft-com:mac:vml" xmlns:p="http://schemas.openxmlformats.org/presentationml/2006/main" xmlns:c="http://schemas.openxmlformats.org/drawingml/2006/chart" xmlns:dgm="http://schemas.openxmlformats.org/drawingml/2006/diagram" xmlns:o="urn:schemas-microsoft-com:office:office" xmlns:v="urn:schemas-microsoft-com:vml" xmlns:pvml="urn:schemas-microsoft-com:office:powerpoint" xmlns:com="http://schemas.openxmlformats.org/drawingml/2006/compatibility" xmlns:p14="http://schemas.microsoft.com/office/powerpoint/2010/main" xmlns:p15="http://schemas.microsoft.com/office/powerpoint/2012/main" xmlns:ahyp="http://schemas.microsoft.com/office/drawing/2018/hyperlinkcolor">
+  <p:cSld>
+    <p:spTree>
+      <p:nvGrpSpPr>
+        <p:cNvPr id="230" name="Shape 230"/>
+        <p:cNvGrpSpPr/>
+        <p:nvPr/>
+      </p:nvGrpSpPr>
+      <p:grpSpPr>
+        <a:xfrm>
+          <a:off x="0" y="0"/>
+          <a:ext cx="0" cy="0"/>
+          <a:chOff x="0" y="0"/>
+          <a:chExt cx="0" cy="0"/>
+        </a:xfrm>
+      </p:grpSpPr>
+      <p:sp>
+        <p:nvSpPr>
+          <p:cNvPr id="231" name="Google Shape;231;p28"/>
+          <p:cNvSpPr txBox="1"/>
+          <p:nvPr>
+            <p:ph type="title"/>
+          </p:nvPr>
+        </p:nvSpPr>
+        <p:spPr>
+          <a:xfrm>
+            <a:off x="311700" y="410000"/>
+            <a:ext cx="8520600" cy="607800"/>
+          </a:xfrm>
+          <a:prstGeom prst="rect">
+            <a:avLst/>
+          </a:prstGeom>
+        </p:spPr>
+        <p:txBody>
+          <a:bodyPr anchorCtr="0" anchor="t" bIns="91425" lIns="91425" spcFirstLastPara="1" rIns="91425" wrap="square" tIns="91425">
+            <a:normAutofit fontScale="90000"/>
+          </a:bodyPr>
+          <a:lstStyle/>
+          <a:p>
+            <a:pPr indent="0" lvl="0" marL="0" rtl="0" algn="l">
+              <a:spcBef>
+                <a:spcPts val="0"/>
+              </a:spcBef>
+              <a:spcAft>
+                <a:spcPts val="0"/>
+              </a:spcAft>
+              <a:buNone/>
+            </a:pPr>
+            <a:r>
+              <a:rPr lang="zh-TW"/>
+              <a:t>ResNet50  Results</a:t>
+            </a:r>
+            <a:endParaRPr/>
+          </a:p>
+        </p:txBody>
+      </p:sp>
+      <p:pic>
+        <p:nvPicPr>
+          <p:cNvPr id="232" name="Google Shape;232;p28"/>
           <p:cNvPicPr preferRelativeResize="0"/>
           <p:nvPr/>
         </p:nvPicPr>
@@ -17463,7 +17760,7 @@
       </p:pic>
       <p:pic>
         <p:nvPicPr>
-          <p:cNvPr id="226" name="Google Shape;226;p27"/>
+          <p:cNvPr id="233" name="Google Shape;233;p28"/>
           <p:cNvPicPr preferRelativeResize="0"/>
           <p:nvPr/>
         </p:nvPicPr>
@@ -17491,7 +17788,7 @@
       </p:pic>
       <p:sp>
         <p:nvSpPr>
-          <p:cNvPr id="227" name="Google Shape;227;p27"/>
+          <p:cNvPr id="234" name="Google Shape;234;p28"/>
           <p:cNvSpPr txBox="1"/>
           <p:nvPr/>
         </p:nvSpPr>
@@ -17549,7 +17846,7 @@
       </p:sp>
       <p:sp>
         <p:nvSpPr>
-          <p:cNvPr id="228" name="Google Shape;228;p27"/>
+          <p:cNvPr id="235" name="Google Shape;235;p28"/>
           <p:cNvSpPr txBox="1"/>
           <p:nvPr/>
         </p:nvSpPr>
@@ -17607,7 +17904,7 @@
       </p:sp>
       <p:pic>
         <p:nvPicPr>
-          <p:cNvPr id="229" name="Google Shape;229;p27"/>
+          <p:cNvPr id="236" name="Google Shape;236;p28"/>
           <p:cNvPicPr preferRelativeResize="0"/>
           <p:nvPr/>
         </p:nvPicPr>
@@ -17641,12 +17938,12 @@
 </p:sld>
 </file>
 
-<file path=ppt/slides/slide16.xml><?xml version="1.0" encoding="utf-8"?>
+<file path=ppt/slides/slide17.xml><?xml version="1.0" encoding="utf-8"?>
 <p:sld xmlns:a="http://schemas.openxmlformats.org/drawingml/2006/main" xmlns:r="http://schemas.openxmlformats.org/officeDocument/2006/relationships" xmlns:mc="http://schemas.openxmlformats.org/markup-compatibility/2006" xmlns:mv="urn:schemas-microsoft-com:mac:vml" xmlns:p="http://schemas.openxmlformats.org/presentationml/2006/main" xmlns:c="http://schemas.openxmlformats.org/drawingml/2006/chart" xmlns:dgm="http://schemas.openxmlformats.org/drawingml/2006/diagram" xmlns:o="urn:schemas-microsoft-com:office:office" xmlns:v="urn:schemas-microsoft-com:vml" xmlns:pvml="urn:schemas-microsoft-com:office:powerpoint" xmlns:com="http://schemas.openxmlformats.org/drawingml/2006/compatibility" xmlns:p14="http://schemas.microsoft.com/office/powerpoint/2010/main" xmlns:p15="http://schemas.microsoft.com/office/powerpoint/2012/main" xmlns:ahyp="http://schemas.microsoft.com/office/drawing/2018/hyperlinkcolor">
   <p:cSld>
     <p:spTree>
       <p:nvGrpSpPr>
-        <p:cNvPr id="233" name="Shape 233"/>
+        <p:cNvPr id="240" name="Shape 240"/>
         <p:cNvGrpSpPr/>
         <p:nvPr/>
       </p:nvGrpSpPr>
@@ -17660,7 +17957,7 @@
       </p:grpSpPr>
       <p:sp>
         <p:nvSpPr>
-          <p:cNvPr id="234" name="Google Shape;234;p28"/>
+          <p:cNvPr id="241" name="Google Shape;241;p29"/>
           <p:cNvSpPr txBox="1"/>
           <p:nvPr>
             <p:ph type="title"/>
@@ -17700,7 +17997,7 @@
       </p:sp>
       <p:sp>
         <p:nvSpPr>
-          <p:cNvPr id="235" name="Google Shape;235;p28"/>
+          <p:cNvPr id="242" name="Google Shape;242;p29"/>
           <p:cNvSpPr txBox="1"/>
           <p:nvPr/>
         </p:nvSpPr>
@@ -17813,7 +18110,7 @@
       </p:sp>
       <p:pic>
         <p:nvPicPr>
-          <p:cNvPr id="236" name="Google Shape;236;p28"/>
+          <p:cNvPr id="243" name="Google Shape;243;p29"/>
           <p:cNvPicPr preferRelativeResize="0"/>
           <p:nvPr/>
         </p:nvPicPr>
@@ -17841,7 +18138,7 @@
       </p:pic>
       <p:sp>
         <p:nvSpPr>
-          <p:cNvPr id="237" name="Google Shape;237;p28"/>
+          <p:cNvPr id="244" name="Google Shape;244;p29"/>
           <p:cNvSpPr/>
           <p:nvPr/>
         </p:nvSpPr>
@@ -17901,7 +18198,7 @@
       </p:sp>
       <p:sp>
         <p:nvSpPr>
-          <p:cNvPr id="238" name="Google Shape;238;p28"/>
+          <p:cNvPr id="245" name="Google Shape;245;p29"/>
           <p:cNvSpPr/>
           <p:nvPr/>
         </p:nvSpPr>
@@ -17961,7 +18258,7 @@
       </p:sp>
       <p:sp>
         <p:nvSpPr>
-          <p:cNvPr id="239" name="Google Shape;239;p28"/>
+          <p:cNvPr id="246" name="Google Shape;246;p29"/>
           <p:cNvSpPr/>
           <p:nvPr/>
         </p:nvSpPr>
@@ -18021,10 +18318,10 @@
       </p:sp>
       <p:cxnSp>
         <p:nvCxnSpPr>
-          <p:cNvPr id="240" name="Google Shape;240;p28"/>
+          <p:cNvPr id="247" name="Google Shape;247;p29"/>
           <p:cNvCxnSpPr>
-            <a:stCxn id="237" idx="3"/>
-            <a:endCxn id="238" idx="1"/>
+            <a:stCxn id="244" idx="3"/>
+            <a:endCxn id="245" idx="1"/>
           </p:cNvCxnSpPr>
           <p:nvPr/>
         </p:nvCxnSpPr>
@@ -18050,7 +18347,7 @@
       </p:cxnSp>
       <p:cxnSp>
         <p:nvCxnSpPr>
-          <p:cNvPr id="241" name="Google Shape;241;p28"/>
+          <p:cNvPr id="248" name="Google Shape;248;p29"/>
           <p:cNvCxnSpPr/>
           <p:nvPr/>
         </p:nvCxnSpPr>
@@ -18076,7 +18373,7 @@
       </p:cxnSp>
       <p:cxnSp>
         <p:nvCxnSpPr>
-          <p:cNvPr id="242" name="Google Shape;242;p28"/>
+          <p:cNvPr id="249" name="Google Shape;249;p29"/>
           <p:cNvCxnSpPr/>
           <p:nvPr/>
         </p:nvCxnSpPr>
@@ -18102,7 +18399,7 @@
       </p:cxnSp>
       <p:sp>
         <p:nvSpPr>
-          <p:cNvPr id="243" name="Google Shape;243;p28"/>
+          <p:cNvPr id="250" name="Google Shape;250;p29"/>
           <p:cNvSpPr txBox="1"/>
           <p:nvPr/>
         </p:nvSpPr>
@@ -18160,7 +18457,7 @@
       </p:sp>
       <p:sp>
         <p:nvSpPr>
-          <p:cNvPr id="244" name="Google Shape;244;p28"/>
+          <p:cNvPr id="251" name="Google Shape;251;p29"/>
           <p:cNvSpPr txBox="1"/>
           <p:nvPr/>
         </p:nvSpPr>
@@ -18218,7 +18515,7 @@
       </p:sp>
       <p:cxnSp>
         <p:nvCxnSpPr>
-          <p:cNvPr id="245" name="Google Shape;245;p28"/>
+          <p:cNvPr id="252" name="Google Shape;252;p29"/>
           <p:cNvCxnSpPr/>
           <p:nvPr/>
         </p:nvCxnSpPr>
@@ -18242,236 +18539,6 @@
           </a:ln>
         </p:spPr>
       </p:cxnSp>
-    </p:spTree>
-  </p:cSld>
-  <p:clrMapOvr>
-    <a:masterClrMapping/>
-  </p:clrMapOvr>
-</p:sld>
-</file>
-
-<file path=ppt/slides/slide17.xml><?xml version="1.0" encoding="utf-8"?>
-<p:sld xmlns:a="http://schemas.openxmlformats.org/drawingml/2006/main" xmlns:r="http://schemas.openxmlformats.org/officeDocument/2006/relationships" xmlns:mc="http://schemas.openxmlformats.org/markup-compatibility/2006" xmlns:mv="urn:schemas-microsoft-com:mac:vml" xmlns:p="http://schemas.openxmlformats.org/presentationml/2006/main" xmlns:c="http://schemas.openxmlformats.org/drawingml/2006/chart" xmlns:dgm="http://schemas.openxmlformats.org/drawingml/2006/diagram" xmlns:o="urn:schemas-microsoft-com:office:office" xmlns:v="urn:schemas-microsoft-com:vml" xmlns:pvml="urn:schemas-microsoft-com:office:powerpoint" xmlns:com="http://schemas.openxmlformats.org/drawingml/2006/compatibility" xmlns:p14="http://schemas.microsoft.com/office/powerpoint/2010/main" xmlns:p15="http://schemas.microsoft.com/office/powerpoint/2012/main" xmlns:ahyp="http://schemas.microsoft.com/office/drawing/2018/hyperlinkcolor">
-  <p:cSld>
-    <p:spTree>
-      <p:nvGrpSpPr>
-        <p:cNvPr id="249" name="Shape 249"/>
-        <p:cNvGrpSpPr/>
-        <p:nvPr/>
-      </p:nvGrpSpPr>
-      <p:grpSpPr>
-        <a:xfrm>
-          <a:off x="0" y="0"/>
-          <a:ext cx="0" cy="0"/>
-          <a:chOff x="0" y="0"/>
-          <a:chExt cx="0" cy="0"/>
-        </a:xfrm>
-      </p:grpSpPr>
-      <p:sp>
-        <p:nvSpPr>
-          <p:cNvPr id="250" name="Google Shape;250;p29"/>
-          <p:cNvSpPr txBox="1"/>
-          <p:nvPr>
-            <p:ph type="title"/>
-          </p:nvPr>
-        </p:nvSpPr>
-        <p:spPr>
-          <a:xfrm>
-            <a:off x="311700" y="410000"/>
-            <a:ext cx="8520600" cy="607800"/>
-          </a:xfrm>
-          <a:prstGeom prst="rect">
-            <a:avLst/>
-          </a:prstGeom>
-        </p:spPr>
-        <p:txBody>
-          <a:bodyPr anchorCtr="0" anchor="t" bIns="91425" lIns="91425" spcFirstLastPara="1" rIns="91425" wrap="square" tIns="91425">
-            <a:normAutofit fontScale="90000"/>
-          </a:bodyPr>
-          <a:lstStyle/>
-          <a:p>
-            <a:pPr indent="0" lvl="0" marL="0" rtl="0" algn="l">
-              <a:spcBef>
-                <a:spcPts val="0"/>
-              </a:spcBef>
-              <a:spcAft>
-                <a:spcPts val="0"/>
-              </a:spcAft>
-              <a:buNone/>
-            </a:pPr>
-            <a:r>
-              <a:rPr lang="zh-TW"/>
-              <a:t>Xception</a:t>
-            </a:r>
-            <a:endParaRPr/>
-          </a:p>
-        </p:txBody>
-      </p:sp>
-      <p:sp>
-        <p:nvSpPr>
-          <p:cNvPr id="251" name="Google Shape;251;p29"/>
-          <p:cNvSpPr txBox="1"/>
-          <p:nvPr/>
-        </p:nvSpPr>
-        <p:spPr>
-          <a:xfrm>
-            <a:off x="925725" y="1401900"/>
-            <a:ext cx="3149100" cy="1877700"/>
-          </a:xfrm>
-          <a:prstGeom prst="rect">
-            <a:avLst/>
-          </a:prstGeom>
-          <a:noFill/>
-          <a:ln>
-            <a:noFill/>
-          </a:ln>
-        </p:spPr>
-        <p:txBody>
-          <a:bodyPr anchorCtr="0" anchor="t" bIns="91425" lIns="91425" spcFirstLastPara="1" rIns="91425" wrap="square" tIns="91425">
-            <a:spAutoFit/>
-          </a:bodyPr>
-          <a:lstStyle/>
-          <a:p>
-            <a:pPr indent="0" lvl="0" marL="0" rtl="0" algn="l">
-              <a:spcBef>
-                <a:spcPts val="0"/>
-              </a:spcBef>
-              <a:spcAft>
-                <a:spcPts val="0"/>
-              </a:spcAft>
-              <a:buNone/>
-            </a:pPr>
-            <a:r>
-              <a:rPr lang="zh-TW" sz="1000">
-                <a:solidFill>
-                  <a:schemeClr val="dk2"/>
-                </a:solidFill>
-                <a:latin typeface="Roboto"/>
-                <a:ea typeface="Roboto"/>
-                <a:cs typeface="Roboto"/>
-                <a:sym typeface="Roboto"/>
-              </a:rPr>
-              <a:t>T</a:t>
-            </a:r>
-            <a:r>
-              <a:rPr lang="zh-TW" sz="1000">
-                <a:solidFill>
-                  <a:schemeClr val="dk2"/>
-                </a:solidFill>
-                <a:latin typeface="Roboto"/>
-                <a:ea typeface="Roboto"/>
-                <a:cs typeface="Roboto"/>
-                <a:sym typeface="Roboto"/>
-              </a:rPr>
-              <a:t>he total number of trainable parameters is equal to twice the number of nodes in the last layer (2 * 2048), resulting in 4096 parameters.</a:t>
-            </a:r>
-            <a:endParaRPr sz="1000">
-              <a:solidFill>
-                <a:schemeClr val="dk2"/>
-              </a:solidFill>
-              <a:latin typeface="Roboto"/>
-              <a:ea typeface="Roboto"/>
-              <a:cs typeface="Roboto"/>
-              <a:sym typeface="Roboto"/>
-            </a:endParaRPr>
-          </a:p>
-          <a:p>
-            <a:pPr indent="0" lvl="0" marL="0" rtl="0" algn="l">
-              <a:spcBef>
-                <a:spcPts val="0"/>
-              </a:spcBef>
-              <a:spcAft>
-                <a:spcPts val="0"/>
-              </a:spcAft>
-              <a:buNone/>
-            </a:pPr>
-            <a:r>
-              <a:t/>
-            </a:r>
-            <a:endParaRPr sz="1000">
-              <a:solidFill>
-                <a:schemeClr val="dk2"/>
-              </a:solidFill>
-              <a:latin typeface="Roboto"/>
-              <a:ea typeface="Roboto"/>
-              <a:cs typeface="Roboto"/>
-              <a:sym typeface="Roboto"/>
-            </a:endParaRPr>
-          </a:p>
-          <a:p>
-            <a:pPr indent="0" lvl="0" marL="0" rtl="0" algn="l">
-              <a:spcBef>
-                <a:spcPts val="0"/>
-              </a:spcBef>
-              <a:spcAft>
-                <a:spcPts val="0"/>
-              </a:spcAft>
-              <a:buNone/>
-            </a:pPr>
-            <a:r>
-              <a:rPr lang="zh-TW" sz="1000">
-                <a:solidFill>
-                  <a:schemeClr val="dk2"/>
-                </a:solidFill>
-                <a:latin typeface="Roboto"/>
-                <a:ea typeface="Roboto"/>
-                <a:cs typeface="Roboto"/>
-                <a:sym typeface="Roboto"/>
-              </a:rPr>
-              <a:t>Similar to previous </a:t>
-            </a:r>
-            <a:r>
-              <a:rPr lang="zh-TW" sz="1000">
-                <a:solidFill>
-                  <a:schemeClr val="dk2"/>
-                </a:solidFill>
-                <a:latin typeface="Roboto"/>
-                <a:ea typeface="Roboto"/>
-                <a:cs typeface="Roboto"/>
-                <a:sym typeface="Roboto"/>
-              </a:rPr>
-              <a:t>the previous configuration, we utilize stochastic gradient descent (SGD) to minimize categorical cross-entropy loss. We also specify the accuracy metric in the code, offering a more easily interpretable measure of the model's performance in terms of correct predictions, as opposed to categorical cross-entropy scores.</a:t>
-            </a:r>
-            <a:endParaRPr sz="1000">
-              <a:solidFill>
-                <a:schemeClr val="dk2"/>
-              </a:solidFill>
-              <a:latin typeface="Roboto"/>
-              <a:ea typeface="Roboto"/>
-              <a:cs typeface="Roboto"/>
-              <a:sym typeface="Roboto"/>
-            </a:endParaRPr>
-          </a:p>
-        </p:txBody>
-      </p:sp>
-      <p:pic>
-        <p:nvPicPr>
-          <p:cNvPr id="252" name="Google Shape;252;p29"/>
-          <p:cNvPicPr preferRelativeResize="0"/>
-          <p:nvPr/>
-        </p:nvPicPr>
-        <p:blipFill>
-          <a:blip r:embed="rId3">
-            <a:alphaModFix/>
-          </a:blip>
-          <a:stretch>
-            <a:fillRect/>
-          </a:stretch>
-        </p:blipFill>
-        <p:spPr>
-          <a:xfrm>
-            <a:off x="4419600" y="1512810"/>
-            <a:ext cx="4572001" cy="1920990"/>
-          </a:xfrm>
-          <a:prstGeom prst="rect">
-            <a:avLst/>
-          </a:prstGeom>
-          <a:noFill/>
-          <a:ln>
-            <a:noFill/>
-          </a:ln>
-        </p:spPr>
-      </p:pic>
     </p:spTree>
   </p:cSld>
   <p:clrMapOvr>
@@ -18531,6 +18598,236 @@
             </a:pPr>
             <a:r>
               <a:rPr lang="zh-TW"/>
+              <a:t>Xception</a:t>
+            </a:r>
+            <a:endParaRPr/>
+          </a:p>
+        </p:txBody>
+      </p:sp>
+      <p:sp>
+        <p:nvSpPr>
+          <p:cNvPr id="258" name="Google Shape;258;p30"/>
+          <p:cNvSpPr txBox="1"/>
+          <p:nvPr/>
+        </p:nvSpPr>
+        <p:spPr>
+          <a:xfrm>
+            <a:off x="925725" y="1401900"/>
+            <a:ext cx="3149100" cy="1877700"/>
+          </a:xfrm>
+          <a:prstGeom prst="rect">
+            <a:avLst/>
+          </a:prstGeom>
+          <a:noFill/>
+          <a:ln>
+            <a:noFill/>
+          </a:ln>
+        </p:spPr>
+        <p:txBody>
+          <a:bodyPr anchorCtr="0" anchor="t" bIns="91425" lIns="91425" spcFirstLastPara="1" rIns="91425" wrap="square" tIns="91425">
+            <a:spAutoFit/>
+          </a:bodyPr>
+          <a:lstStyle/>
+          <a:p>
+            <a:pPr indent="0" lvl="0" marL="0" rtl="0" algn="l">
+              <a:spcBef>
+                <a:spcPts val="0"/>
+              </a:spcBef>
+              <a:spcAft>
+                <a:spcPts val="0"/>
+              </a:spcAft>
+              <a:buNone/>
+            </a:pPr>
+            <a:r>
+              <a:rPr lang="zh-TW" sz="1000">
+                <a:solidFill>
+                  <a:schemeClr val="dk2"/>
+                </a:solidFill>
+                <a:latin typeface="Roboto"/>
+                <a:ea typeface="Roboto"/>
+                <a:cs typeface="Roboto"/>
+                <a:sym typeface="Roboto"/>
+              </a:rPr>
+              <a:t>T</a:t>
+            </a:r>
+            <a:r>
+              <a:rPr lang="zh-TW" sz="1000">
+                <a:solidFill>
+                  <a:schemeClr val="dk2"/>
+                </a:solidFill>
+                <a:latin typeface="Roboto"/>
+                <a:ea typeface="Roboto"/>
+                <a:cs typeface="Roboto"/>
+                <a:sym typeface="Roboto"/>
+              </a:rPr>
+              <a:t>he total number of trainable parameters is equal to twice the number of nodes in the last layer (2 * 2048), resulting in 4096 parameters.</a:t>
+            </a:r>
+            <a:endParaRPr sz="1000">
+              <a:solidFill>
+                <a:schemeClr val="dk2"/>
+              </a:solidFill>
+              <a:latin typeface="Roboto"/>
+              <a:ea typeface="Roboto"/>
+              <a:cs typeface="Roboto"/>
+              <a:sym typeface="Roboto"/>
+            </a:endParaRPr>
+          </a:p>
+          <a:p>
+            <a:pPr indent="0" lvl="0" marL="0" rtl="0" algn="l">
+              <a:spcBef>
+                <a:spcPts val="0"/>
+              </a:spcBef>
+              <a:spcAft>
+                <a:spcPts val="0"/>
+              </a:spcAft>
+              <a:buNone/>
+            </a:pPr>
+            <a:r>
+              <a:t/>
+            </a:r>
+            <a:endParaRPr sz="1000">
+              <a:solidFill>
+                <a:schemeClr val="dk2"/>
+              </a:solidFill>
+              <a:latin typeface="Roboto"/>
+              <a:ea typeface="Roboto"/>
+              <a:cs typeface="Roboto"/>
+              <a:sym typeface="Roboto"/>
+            </a:endParaRPr>
+          </a:p>
+          <a:p>
+            <a:pPr indent="0" lvl="0" marL="0" rtl="0" algn="l">
+              <a:spcBef>
+                <a:spcPts val="0"/>
+              </a:spcBef>
+              <a:spcAft>
+                <a:spcPts val="0"/>
+              </a:spcAft>
+              <a:buNone/>
+            </a:pPr>
+            <a:r>
+              <a:rPr lang="zh-TW" sz="1000">
+                <a:solidFill>
+                  <a:schemeClr val="dk2"/>
+                </a:solidFill>
+                <a:latin typeface="Roboto"/>
+                <a:ea typeface="Roboto"/>
+                <a:cs typeface="Roboto"/>
+                <a:sym typeface="Roboto"/>
+              </a:rPr>
+              <a:t>Similar to previous </a:t>
+            </a:r>
+            <a:r>
+              <a:rPr lang="zh-TW" sz="1000">
+                <a:solidFill>
+                  <a:schemeClr val="dk2"/>
+                </a:solidFill>
+                <a:latin typeface="Roboto"/>
+                <a:ea typeface="Roboto"/>
+                <a:cs typeface="Roboto"/>
+                <a:sym typeface="Roboto"/>
+              </a:rPr>
+              <a:t>the previous configuration, we utilize stochastic gradient descent (SGD) to minimize categorical cross-entropy loss. We also specify the accuracy metric in the code, offering a more easily interpretable measure of the model's performance in terms of correct predictions, as opposed to categorical cross-entropy scores.</a:t>
+            </a:r>
+            <a:endParaRPr sz="1000">
+              <a:solidFill>
+                <a:schemeClr val="dk2"/>
+              </a:solidFill>
+              <a:latin typeface="Roboto"/>
+              <a:ea typeface="Roboto"/>
+              <a:cs typeface="Roboto"/>
+              <a:sym typeface="Roboto"/>
+            </a:endParaRPr>
+          </a:p>
+        </p:txBody>
+      </p:sp>
+      <p:pic>
+        <p:nvPicPr>
+          <p:cNvPr id="259" name="Google Shape;259;p30"/>
+          <p:cNvPicPr preferRelativeResize="0"/>
+          <p:nvPr/>
+        </p:nvPicPr>
+        <p:blipFill>
+          <a:blip r:embed="rId3">
+            <a:alphaModFix/>
+          </a:blip>
+          <a:stretch>
+            <a:fillRect/>
+          </a:stretch>
+        </p:blipFill>
+        <p:spPr>
+          <a:xfrm>
+            <a:off x="4419600" y="1512810"/>
+            <a:ext cx="4572001" cy="1920990"/>
+          </a:xfrm>
+          <a:prstGeom prst="rect">
+            <a:avLst/>
+          </a:prstGeom>
+          <a:noFill/>
+          <a:ln>
+            <a:noFill/>
+          </a:ln>
+        </p:spPr>
+      </p:pic>
+    </p:spTree>
+  </p:cSld>
+  <p:clrMapOvr>
+    <a:masterClrMapping/>
+  </p:clrMapOvr>
+</p:sld>
+</file>
+
+<file path=ppt/slides/slide19.xml><?xml version="1.0" encoding="utf-8"?>
+<p:sld xmlns:a="http://schemas.openxmlformats.org/drawingml/2006/main" xmlns:r="http://schemas.openxmlformats.org/officeDocument/2006/relationships" xmlns:mc="http://schemas.openxmlformats.org/markup-compatibility/2006" xmlns:mv="urn:schemas-microsoft-com:mac:vml" xmlns:p="http://schemas.openxmlformats.org/presentationml/2006/main" xmlns:c="http://schemas.openxmlformats.org/drawingml/2006/chart" xmlns:dgm="http://schemas.openxmlformats.org/drawingml/2006/diagram" xmlns:o="urn:schemas-microsoft-com:office:office" xmlns:v="urn:schemas-microsoft-com:vml" xmlns:pvml="urn:schemas-microsoft-com:office:powerpoint" xmlns:com="http://schemas.openxmlformats.org/drawingml/2006/compatibility" xmlns:p14="http://schemas.microsoft.com/office/powerpoint/2010/main" xmlns:p15="http://schemas.microsoft.com/office/powerpoint/2012/main" xmlns:ahyp="http://schemas.microsoft.com/office/drawing/2018/hyperlinkcolor">
+  <p:cSld>
+    <p:spTree>
+      <p:nvGrpSpPr>
+        <p:cNvPr id="263" name="Shape 263"/>
+        <p:cNvGrpSpPr/>
+        <p:nvPr/>
+      </p:nvGrpSpPr>
+      <p:grpSpPr>
+        <a:xfrm>
+          <a:off x="0" y="0"/>
+          <a:ext cx="0" cy="0"/>
+          <a:chOff x="0" y="0"/>
+          <a:chExt cx="0" cy="0"/>
+        </a:xfrm>
+      </p:grpSpPr>
+      <p:sp>
+        <p:nvSpPr>
+          <p:cNvPr id="264" name="Google Shape;264;p31"/>
+          <p:cNvSpPr txBox="1"/>
+          <p:nvPr>
+            <p:ph type="title"/>
+          </p:nvPr>
+        </p:nvSpPr>
+        <p:spPr>
+          <a:xfrm>
+            <a:off x="311700" y="410000"/>
+            <a:ext cx="8520600" cy="607800"/>
+          </a:xfrm>
+          <a:prstGeom prst="rect">
+            <a:avLst/>
+          </a:prstGeom>
+        </p:spPr>
+        <p:txBody>
+          <a:bodyPr anchorCtr="0" anchor="t" bIns="91425" lIns="91425" spcFirstLastPara="1" rIns="91425" wrap="square" tIns="91425">
+            <a:normAutofit fontScale="90000"/>
+          </a:bodyPr>
+          <a:lstStyle/>
+          <a:p>
+            <a:pPr indent="0" lvl="0" marL="0" rtl="0" algn="l">
+              <a:spcBef>
+                <a:spcPts val="0"/>
+              </a:spcBef>
+              <a:spcAft>
+                <a:spcPts val="0"/>
+              </a:spcAft>
+              <a:buNone/>
+            </a:pPr>
+            <a:r>
+              <a:rPr lang="zh-TW"/>
               <a:t>Xception </a:t>
             </a:r>
             <a:r>
@@ -18543,7 +18840,7 @@
       </p:sp>
       <p:pic>
         <p:nvPicPr>
-          <p:cNvPr id="258" name="Google Shape;258;p30"/>
+          <p:cNvPr id="265" name="Google Shape;265;p31"/>
           <p:cNvPicPr preferRelativeResize="0"/>
           <p:nvPr/>
         </p:nvPicPr>
@@ -18571,7 +18868,7 @@
       </p:pic>
       <p:sp>
         <p:nvSpPr>
-          <p:cNvPr id="259" name="Google Shape;259;p30"/>
+          <p:cNvPr id="266" name="Google Shape;266;p31"/>
           <p:cNvSpPr txBox="1"/>
           <p:nvPr/>
         </p:nvSpPr>
@@ -18629,7 +18926,7 @@
       </p:sp>
       <p:pic>
         <p:nvPicPr>
-          <p:cNvPr id="260" name="Google Shape;260;p30"/>
+          <p:cNvPr id="267" name="Google Shape;267;p31"/>
           <p:cNvPicPr preferRelativeResize="0"/>
           <p:nvPr/>
         </p:nvPicPr>
@@ -18663,12 +18960,12 @@
 </p:sld>
 </file>
 
-<file path=ppt/slides/slide19.xml><?xml version="1.0" encoding="utf-8"?>
+<file path=ppt/slides/slide2.xml><?xml version="1.0" encoding="utf-8"?>
 <p:sld xmlns:a="http://schemas.openxmlformats.org/drawingml/2006/main" xmlns:r="http://schemas.openxmlformats.org/officeDocument/2006/relationships" xmlns:mc="http://schemas.openxmlformats.org/markup-compatibility/2006" xmlns:mv="urn:schemas-microsoft-com:mac:vml" xmlns:p="http://schemas.openxmlformats.org/presentationml/2006/main" xmlns:c="http://schemas.openxmlformats.org/drawingml/2006/chart" xmlns:dgm="http://schemas.openxmlformats.org/drawingml/2006/diagram" xmlns:o="urn:schemas-microsoft-com:office:office" xmlns:v="urn:schemas-microsoft-com:vml" xmlns:pvml="urn:schemas-microsoft-com:office:powerpoint" xmlns:com="http://schemas.openxmlformats.org/drawingml/2006/compatibility" xmlns:p14="http://schemas.microsoft.com/office/powerpoint/2010/main" xmlns:p15="http://schemas.microsoft.com/office/powerpoint/2012/main" xmlns:ahyp="http://schemas.microsoft.com/office/drawing/2018/hyperlinkcolor">
   <p:cSld>
     <p:spTree>
       <p:nvGrpSpPr>
-        <p:cNvPr id="264" name="Shape 264"/>
+        <p:cNvPr id="91" name="Shape 91"/>
         <p:cNvGrpSpPr/>
         <p:nvPr/>
       </p:nvGrpSpPr>
@@ -18682,7 +18979,7 @@
       </p:grpSpPr>
       <p:sp>
         <p:nvSpPr>
-          <p:cNvPr id="265" name="Google Shape;265;p31"/>
+          <p:cNvPr id="92" name="Google Shape;92;p14"/>
           <p:cNvSpPr txBox="1"/>
           <p:nvPr>
             <p:ph type="title"/>
@@ -18714,6 +19011,171 @@
             </a:pPr>
             <a:r>
               <a:rPr lang="zh-TW"/>
+              <a:t>Introduction - Background</a:t>
+            </a:r>
+            <a:endParaRPr/>
+          </a:p>
+          <a:p>
+            <a:pPr indent="0" lvl="0" marL="0" rtl="0" algn="l">
+              <a:spcBef>
+                <a:spcPts val="0"/>
+              </a:spcBef>
+              <a:spcAft>
+                <a:spcPts val="0"/>
+              </a:spcAft>
+              <a:buNone/>
+            </a:pPr>
+            <a:r>
+              <a:t/>
+            </a:r>
+            <a:endParaRPr/>
+          </a:p>
+          <a:p>
+            <a:pPr indent="0" lvl="0" marL="0" rtl="0" algn="l">
+              <a:spcBef>
+                <a:spcPts val="0"/>
+              </a:spcBef>
+              <a:spcAft>
+                <a:spcPts val="0"/>
+              </a:spcAft>
+              <a:buNone/>
+            </a:pPr>
+            <a:r>
+              <a:t/>
+            </a:r>
+            <a:endParaRPr/>
+          </a:p>
+        </p:txBody>
+      </p:sp>
+      <p:sp>
+        <p:nvSpPr>
+          <p:cNvPr id="93" name="Google Shape;93;p14"/>
+          <p:cNvSpPr txBox="1"/>
+          <p:nvPr>
+            <p:ph idx="1" type="body"/>
+          </p:nvPr>
+        </p:nvSpPr>
+        <p:spPr>
+          <a:xfrm>
+            <a:off x="311700" y="1229875"/>
+            <a:ext cx="8520600" cy="3339000"/>
+          </a:xfrm>
+          <a:prstGeom prst="rect">
+            <a:avLst/>
+          </a:prstGeom>
+        </p:spPr>
+        <p:txBody>
+          <a:bodyPr anchorCtr="0" anchor="t" bIns="91425" lIns="91425" spcFirstLastPara="1" rIns="91425" wrap="square" tIns="91425">
+            <a:normAutofit/>
+          </a:bodyPr>
+          <a:lstStyle/>
+          <a:p>
+            <a:pPr indent="0" lvl="0" marL="0" rtl="0" algn="l">
+              <a:spcBef>
+                <a:spcPts val="0"/>
+              </a:spcBef>
+              <a:spcAft>
+                <a:spcPts val="0"/>
+              </a:spcAft>
+              <a:buNone/>
+            </a:pPr>
+            <a:r>
+              <a:rPr lang="zh-TW"/>
+              <a:t>Contemporary vehicles are equipped with built-in cameras that enable them to perceive their surroundings, and some even possess self-driving capabilities. A car endowed with urban area detection features utilizes cutting-edge sensor technologies and machine learning algorithms. This allows it to smartly identify and react to urban environments, enhancing safety and providing a driving experience finely tuned to the intricacies of city living.</a:t>
+            </a:r>
+            <a:endParaRPr/>
+          </a:p>
+          <a:p>
+            <a:pPr indent="0" lvl="0" marL="0" rtl="0" algn="l">
+              <a:spcBef>
+                <a:spcPts val="1200"/>
+              </a:spcBef>
+              <a:spcAft>
+                <a:spcPts val="0"/>
+              </a:spcAft>
+              <a:buNone/>
+            </a:pPr>
+            <a:r>
+              <a:t/>
+            </a:r>
+            <a:endParaRPr/>
+          </a:p>
+          <a:p>
+            <a:pPr indent="0" lvl="0" marL="0" rtl="0" algn="l">
+              <a:spcBef>
+                <a:spcPts val="1200"/>
+              </a:spcBef>
+              <a:spcAft>
+                <a:spcPts val="1200"/>
+              </a:spcAft>
+              <a:buNone/>
+            </a:pPr>
+            <a:r>
+              <a:t/>
+            </a:r>
+            <a:endParaRPr/>
+          </a:p>
+        </p:txBody>
+      </p:sp>
+    </p:spTree>
+  </p:cSld>
+  <p:clrMapOvr>
+    <a:masterClrMapping/>
+  </p:clrMapOvr>
+</p:sld>
+</file>
+
+<file path=ppt/slides/slide20.xml><?xml version="1.0" encoding="utf-8"?>
+<p:sld xmlns:a="http://schemas.openxmlformats.org/drawingml/2006/main" xmlns:r="http://schemas.openxmlformats.org/officeDocument/2006/relationships" xmlns:mc="http://schemas.openxmlformats.org/markup-compatibility/2006" xmlns:mv="urn:schemas-microsoft-com:mac:vml" xmlns:p="http://schemas.openxmlformats.org/presentationml/2006/main" xmlns:c="http://schemas.openxmlformats.org/drawingml/2006/chart" xmlns:dgm="http://schemas.openxmlformats.org/drawingml/2006/diagram" xmlns:o="urn:schemas-microsoft-com:office:office" xmlns:v="urn:schemas-microsoft-com:vml" xmlns:pvml="urn:schemas-microsoft-com:office:powerpoint" xmlns:com="http://schemas.openxmlformats.org/drawingml/2006/compatibility" xmlns:p14="http://schemas.microsoft.com/office/powerpoint/2010/main" xmlns:p15="http://schemas.microsoft.com/office/powerpoint/2012/main" xmlns:ahyp="http://schemas.microsoft.com/office/drawing/2018/hyperlinkcolor">
+  <p:cSld>
+    <p:spTree>
+      <p:nvGrpSpPr>
+        <p:cNvPr id="271" name="Shape 271"/>
+        <p:cNvGrpSpPr/>
+        <p:nvPr/>
+      </p:nvGrpSpPr>
+      <p:grpSpPr>
+        <a:xfrm>
+          <a:off x="0" y="0"/>
+          <a:ext cx="0" cy="0"/>
+          <a:chOff x="0" y="0"/>
+          <a:chExt cx="0" cy="0"/>
+        </a:xfrm>
+      </p:grpSpPr>
+      <p:sp>
+        <p:nvSpPr>
+          <p:cNvPr id="272" name="Google Shape;272;p32"/>
+          <p:cNvSpPr txBox="1"/>
+          <p:nvPr>
+            <p:ph type="title"/>
+          </p:nvPr>
+        </p:nvSpPr>
+        <p:spPr>
+          <a:xfrm>
+            <a:off x="311700" y="410000"/>
+            <a:ext cx="8520600" cy="607800"/>
+          </a:xfrm>
+          <a:prstGeom prst="rect">
+            <a:avLst/>
+          </a:prstGeom>
+        </p:spPr>
+        <p:txBody>
+          <a:bodyPr anchorCtr="0" anchor="t" bIns="91425" lIns="91425" spcFirstLastPara="1" rIns="91425" wrap="square" tIns="91425">
+            <a:normAutofit fontScale="90000"/>
+          </a:bodyPr>
+          <a:lstStyle/>
+          <a:p>
+            <a:pPr indent="0" lvl="0" marL="0" rtl="0" algn="l">
+              <a:spcBef>
+                <a:spcPts val="0"/>
+              </a:spcBef>
+              <a:spcAft>
+                <a:spcPts val="0"/>
+              </a:spcAft>
+              <a:buNone/>
+            </a:pPr>
+            <a:r>
+              <a:rPr lang="zh-TW"/>
               <a:t>Compare the performance of models</a:t>
             </a:r>
             <a:endParaRPr/>
@@ -18722,7 +19184,7 @@
       </p:sp>
       <p:graphicFrame>
         <p:nvGraphicFramePr>
-          <p:cNvPr id="266" name="Google Shape;266;p31"/>
+          <p:cNvPr id="273" name="Google Shape;273;p32"/>
           <p:cNvGraphicFramePr/>
           <p:nvPr/>
         </p:nvGraphicFramePr>
@@ -18735,7 +19197,7 @@
             <a:tbl>
               <a:tblPr>
                 <a:noFill/>
-                <a:tableStyleId>{BBA09A7B-91BE-4200-916E-3503C227CC42}</a:tableStyleId>
+                <a:tableStyleId>{AB49510B-4952-4A84-B414-657EA9592732}</a:tableStyleId>
               </a:tblPr>
               <a:tblGrid>
                 <a:gridCol w="1809750"/>
@@ -19037,12 +19499,12 @@
 </p:sld>
 </file>
 
-<file path=ppt/slides/slide2.xml><?xml version="1.0" encoding="utf-8"?>
+<file path=ppt/slides/slide21.xml><?xml version="1.0" encoding="utf-8"?>
 <p:sld xmlns:a="http://schemas.openxmlformats.org/drawingml/2006/main" xmlns:r="http://schemas.openxmlformats.org/officeDocument/2006/relationships" xmlns:mc="http://schemas.openxmlformats.org/markup-compatibility/2006" xmlns:mv="urn:schemas-microsoft-com:mac:vml" xmlns:p="http://schemas.openxmlformats.org/presentationml/2006/main" xmlns:c="http://schemas.openxmlformats.org/drawingml/2006/chart" xmlns:dgm="http://schemas.openxmlformats.org/drawingml/2006/diagram" xmlns:o="urn:schemas-microsoft-com:office:office" xmlns:v="urn:schemas-microsoft-com:vml" xmlns:pvml="urn:schemas-microsoft-com:office:powerpoint" xmlns:com="http://schemas.openxmlformats.org/drawingml/2006/compatibility" xmlns:p14="http://schemas.microsoft.com/office/powerpoint/2010/main" xmlns:p15="http://schemas.microsoft.com/office/powerpoint/2012/main" xmlns:ahyp="http://schemas.microsoft.com/office/drawing/2018/hyperlinkcolor">
   <p:cSld>
     <p:spTree>
       <p:nvGrpSpPr>
-        <p:cNvPr id="91" name="Shape 91"/>
+        <p:cNvPr id="277" name="Shape 277"/>
         <p:cNvGrpSpPr/>
         <p:nvPr/>
       </p:nvGrpSpPr>
@@ -19056,7 +19518,7 @@
       </p:grpSpPr>
       <p:sp>
         <p:nvSpPr>
-          <p:cNvPr id="92" name="Google Shape;92;p14"/>
+          <p:cNvPr id="278" name="Google Shape;278;p33"/>
           <p:cNvSpPr txBox="1"/>
           <p:nvPr>
             <p:ph type="title"/>
@@ -19088,7 +19550,7 @@
             </a:pPr>
             <a:r>
               <a:rPr lang="zh-TW"/>
-              <a:t>Introduction - Background</a:t>
+              <a:t>Conclusions</a:t>
             </a:r>
             <a:endParaRPr/>
           </a:p>
@@ -19126,172 +19588,7 @@
       </p:sp>
       <p:sp>
         <p:nvSpPr>
-          <p:cNvPr id="93" name="Google Shape;93;p14"/>
-          <p:cNvSpPr txBox="1"/>
-          <p:nvPr>
-            <p:ph idx="1" type="body"/>
-          </p:nvPr>
-        </p:nvSpPr>
-        <p:spPr>
-          <a:xfrm>
-            <a:off x="311700" y="1229875"/>
-            <a:ext cx="8520600" cy="3339000"/>
-          </a:xfrm>
-          <a:prstGeom prst="rect">
-            <a:avLst/>
-          </a:prstGeom>
-        </p:spPr>
-        <p:txBody>
-          <a:bodyPr anchorCtr="0" anchor="t" bIns="91425" lIns="91425" spcFirstLastPara="1" rIns="91425" wrap="square" tIns="91425">
-            <a:normAutofit/>
-          </a:bodyPr>
-          <a:lstStyle/>
-          <a:p>
-            <a:pPr indent="0" lvl="0" marL="0" rtl="0" algn="l">
-              <a:spcBef>
-                <a:spcPts val="0"/>
-              </a:spcBef>
-              <a:spcAft>
-                <a:spcPts val="0"/>
-              </a:spcAft>
-              <a:buNone/>
-            </a:pPr>
-            <a:r>
-              <a:rPr lang="zh-TW"/>
-              <a:t>Contemporary vehicles are equipped with built-in cameras that enable them to perceive their surroundings, and some even possess self-driving capabilities. A car endowed with urban area detection features utilizes cutting-edge sensor technologies and machine learning algorithms. This allows it to smartly identify and react to urban environments, enhancing safety and providing a driving experience finely tuned to the intricacies of city living.</a:t>
-            </a:r>
-            <a:endParaRPr/>
-          </a:p>
-          <a:p>
-            <a:pPr indent="0" lvl="0" marL="0" rtl="0" algn="l">
-              <a:spcBef>
-                <a:spcPts val="1200"/>
-              </a:spcBef>
-              <a:spcAft>
-                <a:spcPts val="0"/>
-              </a:spcAft>
-              <a:buNone/>
-            </a:pPr>
-            <a:r>
-              <a:t/>
-            </a:r>
-            <a:endParaRPr/>
-          </a:p>
-          <a:p>
-            <a:pPr indent="0" lvl="0" marL="0" rtl="0" algn="l">
-              <a:spcBef>
-                <a:spcPts val="1200"/>
-              </a:spcBef>
-              <a:spcAft>
-                <a:spcPts val="1200"/>
-              </a:spcAft>
-              <a:buNone/>
-            </a:pPr>
-            <a:r>
-              <a:t/>
-            </a:r>
-            <a:endParaRPr/>
-          </a:p>
-        </p:txBody>
-      </p:sp>
-    </p:spTree>
-  </p:cSld>
-  <p:clrMapOvr>
-    <a:masterClrMapping/>
-  </p:clrMapOvr>
-</p:sld>
-</file>
-
-<file path=ppt/slides/slide20.xml><?xml version="1.0" encoding="utf-8"?>
-<p:sld xmlns:a="http://schemas.openxmlformats.org/drawingml/2006/main" xmlns:r="http://schemas.openxmlformats.org/officeDocument/2006/relationships" xmlns:mc="http://schemas.openxmlformats.org/markup-compatibility/2006" xmlns:mv="urn:schemas-microsoft-com:mac:vml" xmlns:p="http://schemas.openxmlformats.org/presentationml/2006/main" xmlns:c="http://schemas.openxmlformats.org/drawingml/2006/chart" xmlns:dgm="http://schemas.openxmlformats.org/drawingml/2006/diagram" xmlns:o="urn:schemas-microsoft-com:office:office" xmlns:v="urn:schemas-microsoft-com:vml" xmlns:pvml="urn:schemas-microsoft-com:office:powerpoint" xmlns:com="http://schemas.openxmlformats.org/drawingml/2006/compatibility" xmlns:p14="http://schemas.microsoft.com/office/powerpoint/2010/main" xmlns:p15="http://schemas.microsoft.com/office/powerpoint/2012/main" xmlns:ahyp="http://schemas.microsoft.com/office/drawing/2018/hyperlinkcolor">
-  <p:cSld>
-    <p:spTree>
-      <p:nvGrpSpPr>
-        <p:cNvPr id="270" name="Shape 270"/>
-        <p:cNvGrpSpPr/>
-        <p:nvPr/>
-      </p:nvGrpSpPr>
-      <p:grpSpPr>
-        <a:xfrm>
-          <a:off x="0" y="0"/>
-          <a:ext cx="0" cy="0"/>
-          <a:chOff x="0" y="0"/>
-          <a:chExt cx="0" cy="0"/>
-        </a:xfrm>
-      </p:grpSpPr>
-      <p:sp>
-        <p:nvSpPr>
-          <p:cNvPr id="271" name="Google Shape;271;p32"/>
-          <p:cNvSpPr txBox="1"/>
-          <p:nvPr>
-            <p:ph type="title"/>
-          </p:nvPr>
-        </p:nvSpPr>
-        <p:spPr>
-          <a:xfrm>
-            <a:off x="311700" y="410000"/>
-            <a:ext cx="8520600" cy="607800"/>
-          </a:xfrm>
-          <a:prstGeom prst="rect">
-            <a:avLst/>
-          </a:prstGeom>
-        </p:spPr>
-        <p:txBody>
-          <a:bodyPr anchorCtr="0" anchor="t" bIns="91425" lIns="91425" spcFirstLastPara="1" rIns="91425" wrap="square" tIns="91425">
-            <a:normAutofit fontScale="90000"/>
-          </a:bodyPr>
-          <a:lstStyle/>
-          <a:p>
-            <a:pPr indent="0" lvl="0" marL="0" rtl="0" algn="l">
-              <a:spcBef>
-                <a:spcPts val="0"/>
-              </a:spcBef>
-              <a:spcAft>
-                <a:spcPts val="0"/>
-              </a:spcAft>
-              <a:buNone/>
-            </a:pPr>
-            <a:r>
-              <a:rPr lang="zh-TW"/>
-              <a:t>Conclusions</a:t>
-            </a:r>
-            <a:endParaRPr/>
-          </a:p>
-          <a:p>
-            <a:pPr indent="0" lvl="0" marL="0" rtl="0" algn="l">
-              <a:spcBef>
-                <a:spcPts val="0"/>
-              </a:spcBef>
-              <a:spcAft>
-                <a:spcPts val="0"/>
-              </a:spcAft>
-              <a:buNone/>
-            </a:pPr>
-            <a:r>
-              <a:t/>
-            </a:r>
-            <a:endParaRPr/>
-          </a:p>
-          <a:p>
-            <a:pPr indent="0" lvl="0" marL="0" rtl="0" algn="l">
-              <a:spcBef>
-                <a:spcPts val="0"/>
-              </a:spcBef>
-              <a:spcAft>
-                <a:spcPts val="0"/>
-              </a:spcAft>
-              <a:buNone/>
-            </a:pPr>
-            <a:r>
-              <a:t/>
-            </a:r>
-            <a:endParaRPr/>
-          </a:p>
-        </p:txBody>
-      </p:sp>
-      <p:sp>
-        <p:nvSpPr>
-          <p:cNvPr id="272" name="Google Shape;272;p32"/>
+          <p:cNvPr id="279" name="Google Shape;279;p33"/>
           <p:cNvSpPr txBox="1"/>
           <p:nvPr>
             <p:ph idx="1" type="body"/>
@@ -19451,12 +19748,12 @@
 </p:sld>
 </file>
 
-<file path=ppt/slides/slide21.xml><?xml version="1.0" encoding="utf-8"?>
+<file path=ppt/slides/slide22.xml><?xml version="1.0" encoding="utf-8"?>
 <p:sld xmlns:a="http://schemas.openxmlformats.org/drawingml/2006/main" xmlns:r="http://schemas.openxmlformats.org/officeDocument/2006/relationships" xmlns:mc="http://schemas.openxmlformats.org/markup-compatibility/2006" xmlns:mv="urn:schemas-microsoft-com:mac:vml" xmlns:p="http://schemas.openxmlformats.org/presentationml/2006/main" xmlns:c="http://schemas.openxmlformats.org/drawingml/2006/chart" xmlns:dgm="http://schemas.openxmlformats.org/drawingml/2006/diagram" xmlns:o="urn:schemas-microsoft-com:office:office" xmlns:v="urn:schemas-microsoft-com:vml" xmlns:pvml="urn:schemas-microsoft-com:office:powerpoint" xmlns:com="http://schemas.openxmlformats.org/drawingml/2006/compatibility" xmlns:p14="http://schemas.microsoft.com/office/powerpoint/2010/main" xmlns:p15="http://schemas.microsoft.com/office/powerpoint/2012/main" xmlns:ahyp="http://schemas.microsoft.com/office/drawing/2018/hyperlinkcolor">
   <p:cSld>
     <p:spTree>
       <p:nvGrpSpPr>
-        <p:cNvPr id="276" name="Shape 276"/>
+        <p:cNvPr id="283" name="Shape 283"/>
         <p:cNvGrpSpPr/>
         <p:nvPr/>
       </p:nvGrpSpPr>
@@ -19470,7 +19767,7 @@
       </p:grpSpPr>
       <p:sp>
         <p:nvSpPr>
-          <p:cNvPr id="277" name="Google Shape;277;p33"/>
+          <p:cNvPr id="284" name="Google Shape;284;p34"/>
           <p:cNvSpPr txBox="1"/>
           <p:nvPr>
             <p:ph type="title"/>
@@ -19510,7 +19807,7 @@
       </p:sp>
       <p:sp>
         <p:nvSpPr>
-          <p:cNvPr id="278" name="Google Shape;278;p33"/>
+          <p:cNvPr id="285" name="Google Shape;285;p34"/>
           <p:cNvSpPr txBox="1"/>
           <p:nvPr>
             <p:ph idx="1" type="body"/>
@@ -19656,12 +19953,12 @@
 </p:sld>
 </file>
 
-<file path=ppt/slides/slide22.xml><?xml version="1.0" encoding="utf-8"?>
+<file path=ppt/slides/slide23.xml><?xml version="1.0" encoding="utf-8"?>
 <p:sld xmlns:a="http://schemas.openxmlformats.org/drawingml/2006/main" xmlns:r="http://schemas.openxmlformats.org/officeDocument/2006/relationships" xmlns:mc="http://schemas.openxmlformats.org/markup-compatibility/2006" xmlns:mv="urn:schemas-microsoft-com:mac:vml" xmlns:p="http://schemas.openxmlformats.org/presentationml/2006/main" xmlns:c="http://schemas.openxmlformats.org/drawingml/2006/chart" xmlns:dgm="http://schemas.openxmlformats.org/drawingml/2006/diagram" xmlns:o="urn:schemas-microsoft-com:office:office" xmlns:v="urn:schemas-microsoft-com:vml" xmlns:pvml="urn:schemas-microsoft-com:office:powerpoint" xmlns:com="http://schemas.openxmlformats.org/drawingml/2006/compatibility" xmlns:p14="http://schemas.microsoft.com/office/powerpoint/2010/main" xmlns:p15="http://schemas.microsoft.com/office/powerpoint/2012/main" xmlns:ahyp="http://schemas.microsoft.com/office/drawing/2018/hyperlinkcolor">
   <p:cSld>
     <p:spTree>
       <p:nvGrpSpPr>
-        <p:cNvPr id="282" name="Shape 282"/>
+        <p:cNvPr id="289" name="Shape 289"/>
         <p:cNvGrpSpPr/>
         <p:nvPr/>
       </p:nvGrpSpPr>
@@ -19675,7 +19972,7 @@
       </p:grpSpPr>
       <p:sp>
         <p:nvSpPr>
-          <p:cNvPr id="283" name="Google Shape;283;p34"/>
+          <p:cNvPr id="290" name="Google Shape;290;p35"/>
           <p:cNvSpPr txBox="1"/>
           <p:nvPr>
             <p:ph type="title"/>
@@ -19715,7 +20012,7 @@
       </p:sp>
       <p:sp>
         <p:nvSpPr>
-          <p:cNvPr id="284" name="Google Shape;284;p34"/>
+          <p:cNvPr id="291" name="Google Shape;291;p35"/>
           <p:cNvSpPr txBox="1"/>
           <p:nvPr>
             <p:ph idx="1" type="body"/>
@@ -19865,12 +20162,12 @@
 </p:sld>
 </file>
 
-<file path=ppt/slides/slide23.xml><?xml version="1.0" encoding="utf-8"?>
+<file path=ppt/slides/slide24.xml><?xml version="1.0" encoding="utf-8"?>
 <p:sld xmlns:a="http://schemas.openxmlformats.org/drawingml/2006/main" xmlns:r="http://schemas.openxmlformats.org/officeDocument/2006/relationships" xmlns:mc="http://schemas.openxmlformats.org/markup-compatibility/2006" xmlns:mv="urn:schemas-microsoft-com:mac:vml" xmlns:p="http://schemas.openxmlformats.org/presentationml/2006/main" xmlns:c="http://schemas.openxmlformats.org/drawingml/2006/chart" xmlns:dgm="http://schemas.openxmlformats.org/drawingml/2006/diagram" xmlns:o="urn:schemas-microsoft-com:office:office" xmlns:v="urn:schemas-microsoft-com:vml" xmlns:pvml="urn:schemas-microsoft-com:office:powerpoint" xmlns:com="http://schemas.openxmlformats.org/drawingml/2006/compatibility" xmlns:p14="http://schemas.microsoft.com/office/powerpoint/2010/main" xmlns:p15="http://schemas.microsoft.com/office/powerpoint/2012/main" xmlns:ahyp="http://schemas.microsoft.com/office/drawing/2018/hyperlinkcolor">
   <p:cSld>
     <p:spTree>
       <p:nvGrpSpPr>
-        <p:cNvPr id="288" name="Shape 288"/>
+        <p:cNvPr id="295" name="Shape 295"/>
         <p:cNvGrpSpPr/>
         <p:nvPr/>
       </p:nvGrpSpPr>
@@ -19884,7 +20181,7 @@
       </p:grpSpPr>
       <p:sp>
         <p:nvSpPr>
-          <p:cNvPr id="289" name="Google Shape;289;p35"/>
+          <p:cNvPr id="296" name="Google Shape;296;p36"/>
           <p:cNvSpPr txBox="1"/>
           <p:nvPr>
             <p:ph type="title"/>
@@ -19924,7 +20221,7 @@
       </p:sp>
       <p:sp>
         <p:nvSpPr>
-          <p:cNvPr id="290" name="Google Shape;290;p35"/>
+          <p:cNvPr id="297" name="Google Shape;297;p36"/>
           <p:cNvSpPr txBox="1"/>
           <p:nvPr>
             <p:ph idx="1" type="body"/>
@@ -23300,11 +23597,7 @@
             </a:pPr>
             <a:r>
               <a:rPr lang="zh-TW"/>
-              <a:t>Label</a:t>
-            </a:r>
-            <a:r>
-              <a:rPr lang="zh-TW"/>
-              <a:t> counts per category</a:t>
+              <a:t>About data</a:t>
             </a:r>
             <a:endParaRPr/>
           </a:p>
@@ -23337,12 +23630,91 @@
               <a:t/>
             </a:r>
             <a:endParaRPr/>
+          </a:p>
+        </p:txBody>
+      </p:sp>
+      <p:sp>
+        <p:nvSpPr>
+          <p:cNvPr id="172" name="Google Shape;172;p20"/>
+          <p:cNvSpPr txBox="1"/>
+          <p:nvPr>
+            <p:ph idx="1" type="body"/>
+          </p:nvPr>
+        </p:nvSpPr>
+        <p:spPr>
+          <a:xfrm>
+            <a:off x="891300" y="1307000"/>
+            <a:ext cx="3680700" cy="3309900"/>
+          </a:xfrm>
+          <a:prstGeom prst="rect">
+            <a:avLst/>
+          </a:prstGeom>
+        </p:spPr>
+        <p:txBody>
+          <a:bodyPr anchorCtr="0" anchor="t" bIns="91425" lIns="91425" spcFirstLastPara="1" rIns="91425" wrap="square" tIns="91425">
+            <a:normAutofit/>
+          </a:bodyPr>
+          <a:lstStyle/>
+          <a:p>
+            <a:pPr indent="0" lvl="0" marL="0" rtl="0" algn="l">
+              <a:spcBef>
+                <a:spcPts val="0"/>
+              </a:spcBef>
+              <a:spcAft>
+                <a:spcPts val="0"/>
+              </a:spcAft>
+              <a:buNone/>
+            </a:pPr>
+            <a:r>
+              <a:rPr lang="zh-TW" sz="1200">
+                <a:latin typeface="Arial"/>
+                <a:ea typeface="Arial"/>
+                <a:cs typeface="Arial"/>
+                <a:sym typeface="Arial"/>
+              </a:rPr>
+              <a:t>The image will be resized to 224 x 224 x 3 with 256 RGB colors. An example image can be converted into an array with a shape of (12, 224, 224, 3), where 12 represents the batch size, 224 represents the height and width, and 3 represents RGB colors</a:t>
+            </a:r>
+            <a:r>
+              <a:rPr lang="zh-TW" sz="1200">
+                <a:latin typeface="Arial"/>
+                <a:ea typeface="Arial"/>
+                <a:cs typeface="Arial"/>
+                <a:sym typeface="Arial"/>
+              </a:rPr>
+              <a:t>.</a:t>
+            </a:r>
+            <a:endParaRPr sz="1200">
+              <a:latin typeface="Arial"/>
+              <a:ea typeface="Arial"/>
+              <a:cs typeface="Arial"/>
+              <a:sym typeface="Arial"/>
+            </a:endParaRPr>
+          </a:p>
+          <a:p>
+            <a:pPr indent="0" lvl="0" marL="0" rtl="0" algn="l">
+              <a:spcBef>
+                <a:spcPts val="1200"/>
+              </a:spcBef>
+              <a:spcAft>
+                <a:spcPts val="1200"/>
+              </a:spcAft>
+              <a:buNone/>
+            </a:pPr>
+            <a:r>
+              <a:t/>
+            </a:r>
+            <a:endParaRPr sz="1200">
+              <a:latin typeface="Arial"/>
+              <a:ea typeface="Arial"/>
+              <a:cs typeface="Arial"/>
+              <a:sym typeface="Arial"/>
+            </a:endParaRPr>
           </a:p>
         </p:txBody>
       </p:sp>
       <p:pic>
         <p:nvPicPr>
-          <p:cNvPr id="172" name="Google Shape;172;p20"/>
+          <p:cNvPr id="173" name="Google Shape;173;p20"/>
           <p:cNvPicPr preferRelativeResize="0"/>
           <p:nvPr/>
         </p:nvPicPr>
@@ -23356,8 +23728,8 @@
         </p:blipFill>
         <p:spPr>
           <a:xfrm>
-            <a:off x="885463" y="1247175"/>
-            <a:ext cx="4471274" cy="2913250"/>
+            <a:off x="5155200" y="1306988"/>
+            <a:ext cx="2401625" cy="2529525"/>
           </a:xfrm>
           <a:prstGeom prst="rect">
             <a:avLst/>
@@ -23368,48 +23740,6 @@
           </a:ln>
         </p:spPr>
       </p:pic>
-      <p:sp>
-        <p:nvSpPr>
-          <p:cNvPr id="173" name="Google Shape;173;p20"/>
-          <p:cNvSpPr txBox="1"/>
-          <p:nvPr/>
-        </p:nvSpPr>
-        <p:spPr>
-          <a:xfrm>
-            <a:off x="5853075" y="1371150"/>
-            <a:ext cx="2482800" cy="1369800"/>
-          </a:xfrm>
-          <a:prstGeom prst="rect">
-            <a:avLst/>
-          </a:prstGeom>
-          <a:noFill/>
-          <a:ln>
-            <a:noFill/>
-          </a:ln>
-        </p:spPr>
-        <p:txBody>
-          <a:bodyPr anchorCtr="0" anchor="t" bIns="91425" lIns="91425" spcFirstLastPara="1" rIns="91425" wrap="square" tIns="91425">
-            <a:spAutoFit/>
-          </a:bodyPr>
-          <a:lstStyle/>
-          <a:p>
-            <a:pPr indent="0" lvl="0" marL="0" rtl="0" algn="l">
-              <a:spcBef>
-                <a:spcPts val="0"/>
-              </a:spcBef>
-              <a:spcAft>
-                <a:spcPts val="0"/>
-              </a:spcAft>
-              <a:buNone/>
-            </a:pPr>
-            <a:r>
-              <a:rPr lang="zh-TW" sz="1100"/>
-              <a:t>The dataset is divided into training data, comprising 36 images for each urban and rural scene, and a test set, which incorporates 10 images for each category. The labeling is based on the directory names of the respective image files.</a:t>
-            </a:r>
-            <a:endParaRPr sz="1100"/>
-          </a:p>
-        </p:txBody>
-      </p:sp>
     </p:spTree>
   </p:cSld>
   <p:clrMapOvr>
@@ -23469,7 +23799,41 @@
             </a:pPr>
             <a:r>
               <a:rPr lang="zh-TW"/>
-              <a:t>Data augmentation</a:t>
+              <a:t>Label</a:t>
+            </a:r>
+            <a:r>
+              <a:rPr lang="zh-TW"/>
+              <a:t> counts per category</a:t>
+            </a:r>
+            <a:endParaRPr/>
+          </a:p>
+          <a:p>
+            <a:pPr indent="0" lvl="0" marL="0" rtl="0" algn="l">
+              <a:spcBef>
+                <a:spcPts val="0"/>
+              </a:spcBef>
+              <a:spcAft>
+                <a:spcPts val="0"/>
+              </a:spcAft>
+              <a:buNone/>
+            </a:pPr>
+            <a:r>
+              <a:t/>
+            </a:r>
+            <a:endParaRPr/>
+          </a:p>
+          <a:p>
+            <a:pPr indent="0" lvl="0" marL="0" rtl="0" algn="l">
+              <a:spcBef>
+                <a:spcPts val="0"/>
+              </a:spcBef>
+              <a:spcAft>
+                <a:spcPts val="0"/>
+              </a:spcAft>
+              <a:buNone/>
+            </a:pPr>
+            <a:r>
+              <a:t/>
             </a:r>
             <a:endParaRPr/>
           </a:p>
@@ -23491,8 +23855,8 @@
         </p:blipFill>
         <p:spPr>
           <a:xfrm>
-            <a:off x="3256475" y="1219363"/>
-            <a:ext cx="5191100" cy="2704775"/>
+            <a:off x="885463" y="1247175"/>
+            <a:ext cx="4471274" cy="2913250"/>
           </a:xfrm>
           <a:prstGeom prst="rect">
             <a:avLst/>
@@ -23511,8 +23875,8 @@
         </p:nvSpPr>
         <p:spPr>
           <a:xfrm>
-            <a:off x="505850" y="1219350"/>
-            <a:ext cx="2699100" cy="2401200"/>
+            <a:off x="5853075" y="1371150"/>
+            <a:ext cx="2482800" cy="1369800"/>
           </a:xfrm>
           <a:prstGeom prst="rect">
             <a:avLst/>
@@ -23538,81 +23902,10 @@
               <a:buNone/>
             </a:pPr>
             <a:r>
-              <a:rPr lang="zh-TW" sz="1200">
-                <a:solidFill>
-                  <a:schemeClr val="dk2"/>
-                </a:solidFill>
-                <a:latin typeface="Roboto"/>
-                <a:ea typeface="Roboto"/>
-                <a:cs typeface="Roboto"/>
-                <a:sym typeface="Roboto"/>
-              </a:rPr>
-              <a:t>Data augmentation is a low-cost and effective approach to improving the performance and accuracy of machine learning models in data-constrained scenarios.</a:t>
-            </a:r>
-            <a:endParaRPr sz="1200">
-              <a:solidFill>
-                <a:schemeClr val="dk2"/>
-              </a:solidFill>
-              <a:latin typeface="Roboto"/>
-              <a:ea typeface="Roboto"/>
-              <a:cs typeface="Roboto"/>
-              <a:sym typeface="Roboto"/>
-            </a:endParaRPr>
-          </a:p>
-          <a:p>
-            <a:pPr indent="0" lvl="0" marL="0" rtl="0" algn="l">
-              <a:spcBef>
-                <a:spcPts val="0"/>
-              </a:spcBef>
-              <a:spcAft>
-                <a:spcPts val="0"/>
-              </a:spcAft>
-              <a:buNone/>
-            </a:pPr>
-            <a:r>
-              <a:t/>
-            </a:r>
-            <a:endParaRPr sz="1200">
-              <a:solidFill>
-                <a:schemeClr val="dk2"/>
-              </a:solidFill>
-              <a:latin typeface="Roboto"/>
-              <a:ea typeface="Roboto"/>
-              <a:cs typeface="Roboto"/>
-              <a:sym typeface="Roboto"/>
-            </a:endParaRPr>
-          </a:p>
-          <a:p>
-            <a:pPr indent="0" lvl="0" marL="0" rtl="0" algn="l">
-              <a:spcBef>
-                <a:spcPts val="0"/>
-              </a:spcBef>
-              <a:spcAft>
-                <a:spcPts val="0"/>
-              </a:spcAft>
-              <a:buNone/>
-            </a:pPr>
-            <a:r>
-              <a:rPr lang="zh-TW" sz="1200">
-                <a:solidFill>
-                  <a:schemeClr val="dk2"/>
-                </a:solidFill>
-                <a:latin typeface="Roboto"/>
-                <a:ea typeface="Roboto"/>
-                <a:cs typeface="Roboto"/>
-                <a:sym typeface="Roboto"/>
-              </a:rPr>
-              <a:t>In our specific scenario, unrestricted rotation is not feasible due to the necessity for the building to maintain an upright appearance. Nevertheless, horizontal flipping and cropping remains a viable option.</a:t>
-            </a:r>
-            <a:endParaRPr sz="1200">
-              <a:solidFill>
-                <a:schemeClr val="dk2"/>
-              </a:solidFill>
-              <a:latin typeface="Roboto"/>
-              <a:ea typeface="Roboto"/>
-              <a:cs typeface="Roboto"/>
-              <a:sym typeface="Roboto"/>
-            </a:endParaRPr>
+              <a:rPr lang="zh-TW" sz="1100"/>
+              <a:t>The dataset is divided into training data, comprising 36 images for each urban and rural scene, and a test set, which incorporates 10 images for each category. The labeling is based on the directory names of the respective image files.</a:t>
+            </a:r>
+            <a:endParaRPr sz="1100"/>
           </a:p>
         </p:txBody>
       </p:sp>

</xml_diff>